<commit_message>
Edited ppt and svm3 results
</commit_message>
<xml_diff>
--- a/report/Group34_Proposal_FinalPres.pptx
+++ b/report/Group34_Proposal_FinalPres.pptx
@@ -13949,7 +13949,7 @@
               <a:buNone/>
             </a:pPr>
             <a:r>
-              <a:rPr lang="en-US" sz="4400" b="0" i="0" u="none" strike="noStrike" cap="none" baseline="0">
+              <a:rPr lang="en-US" sz="4400" b="0" i="0" u="none" strike="noStrike" cap="none" baseline="0" dirty="0">
                 <a:solidFill>
                   <a:schemeClr val="dk1"/>
                 </a:solidFill>
@@ -14080,47 +14080,11 @@
             </a:pPr>
             <a:r>
               <a:rPr lang="en-US" dirty="0"/>
-              <a:t>False Positives not preferred (High precision)</a:t>
-            </a:r>
-          </a:p>
-          <a:p>
-            <a:pPr marL="285750" marR="0" lvl="0" indent="-285750" algn="l" rtl="0">
-              <a:lnSpc>
-                <a:spcPct val="90000"/>
-              </a:lnSpc>
-              <a:spcBef>
-                <a:spcPts val="1000"/>
-              </a:spcBef>
-              <a:buClr>
-                <a:schemeClr val="dk1"/>
-              </a:buClr>
-              <a:buSzPct val="100000"/>
-              <a:buFont typeface="Arial"/>
-              <a:buChar char="•"/>
-            </a:pPr>
-            <a:r>
-              <a:rPr lang="en-US" sz="2800" b="0" i="0" u="none" strike="noStrike" cap="none" baseline="0" dirty="0" smtClean="0">
-                <a:solidFill>
-                  <a:schemeClr val="dk1"/>
-                </a:solidFill>
-                <a:latin typeface="Calibri"/>
-                <a:ea typeface="Calibri"/>
-                <a:cs typeface="Calibri"/>
-                <a:sym typeface="Calibri"/>
-              </a:rPr>
-              <a:t>Exploration </a:t>
+              <a:t>False Positives not preferred (High precision</a:t>
             </a:r>
             <a:r>
-              <a:rPr lang="en-US" sz="2800" b="0" i="0" u="none" strike="noStrike" cap="none" baseline="0" dirty="0">
-                <a:solidFill>
-                  <a:schemeClr val="dk1"/>
-                </a:solidFill>
-                <a:latin typeface="Calibri"/>
-                <a:ea typeface="Calibri"/>
-                <a:cs typeface="Calibri"/>
-                <a:sym typeface="Calibri"/>
-              </a:rPr>
-              <a:t>an ensemble of classifiers</a:t>
+              <a:rPr lang="en-US" dirty="0" smtClean="0"/>
+              <a:t>)</a:t>
             </a:r>
           </a:p>
         </p:txBody>
@@ -14147,8 +14111,38 @@
         </p:blipFill>
         <p:spPr>
           <a:xfrm>
-            <a:off x="930241" y="4173219"/>
+            <a:off x="194389" y="4071473"/>
             <a:ext cx="5664200" cy="1790700"/>
+          </a:xfrm>
+          <a:prstGeom prst="rect">
+            <a:avLst/>
+          </a:prstGeom>
+        </p:spPr>
+      </p:pic>
+      <p:pic>
+        <p:nvPicPr>
+          <p:cNvPr id="4" name="Picture 3" descr="Screen Shot 2015-11-14 at 9.35.13 pm.png"/>
+          <p:cNvPicPr>
+            <a:picLocks noChangeAspect="1"/>
+          </p:cNvPicPr>
+          <p:nvPr/>
+        </p:nvPicPr>
+        <p:blipFill>
+          <a:blip r:embed="rId4">
+            <a:extLst>
+              <a:ext uri="{28A0092B-C50C-407E-A947-70E740481C1C}">
+                <a14:useLocalDpi xmlns:a14="http://schemas.microsoft.com/office/drawing/2010/main" val="0"/>
+              </a:ext>
+            </a:extLst>
+          </a:blip>
+          <a:stretch>
+            <a:fillRect/>
+          </a:stretch>
+        </p:blipFill>
+        <p:spPr>
+          <a:xfrm>
+            <a:off x="5999257" y="4147673"/>
+            <a:ext cx="5448300" cy="1714500"/>
           </a:xfrm>
           <a:prstGeom prst="rect">
             <a:avLst/>

</xml_diff>

<commit_message>
Add url for flight distance data
</commit_message>
<xml_diff>
--- a/report/Group34_Proposal_FinalPres.pptx
+++ b/report/Group34_Proposal_FinalPres.pptx
@@ -55,7 +55,7 @@
       </p:grpSpPr>
       <p:sp>
         <p:nvSpPr>
-          <p:cNvPr id="73" name="PlaceHolder 1"/>
+          <p:cNvPr id="72" name="PlaceHolder 1"/>
           <p:cNvSpPr>
             <a:spLocks noGrp="1"/>
           </p:cNvSpPr>
@@ -87,7 +87,7 @@
       </p:sp>
       <p:sp>
         <p:nvSpPr>
-          <p:cNvPr id="74" name="PlaceHolder 2"/>
+          <p:cNvPr id="73" name="PlaceHolder 2"/>
           <p:cNvSpPr>
             <a:spLocks noGrp="1"/>
           </p:cNvSpPr>
@@ -119,7 +119,7 @@
       </p:sp>
       <p:sp>
         <p:nvSpPr>
-          <p:cNvPr id="75" name="PlaceHolder 3"/>
+          <p:cNvPr id="74" name="PlaceHolder 3"/>
           <p:cNvSpPr>
             <a:spLocks noGrp="1"/>
           </p:cNvSpPr>
@@ -152,7 +152,7 @@
       </p:sp>
       <p:sp>
         <p:nvSpPr>
-          <p:cNvPr id="76" name="PlaceHolder 4"/>
+          <p:cNvPr id="75" name="PlaceHolder 4"/>
           <p:cNvSpPr>
             <a:spLocks noGrp="1"/>
           </p:cNvSpPr>
@@ -184,7 +184,7 @@
       </p:sp>
       <p:sp>
         <p:nvSpPr>
-          <p:cNvPr id="77" name="PlaceHolder 5"/>
+          <p:cNvPr id="76" name="PlaceHolder 5"/>
           <p:cNvSpPr>
             <a:spLocks noGrp="1"/>
           </p:cNvSpPr>
@@ -205,7 +205,7 @@
           <a:bodyPr lIns="0" rIns="0" tIns="0" bIns="0" anchor="b"/>
           <a:p>
             <a:pPr algn="r"/>
-            <a:fld id="{6CC5548E-93AF-45A3-B8D1-0DA4850E10ED}" type="slidenum">
+            <a:fld id="{DC1F1DBB-98D4-498E-A970-92B8959746A4}" type="slidenum">
               <a:rPr lang="en-GB" sz="1400" spc="-1">
                 <a:latin typeface="Times New Roman"/>
               </a:rPr>
@@ -240,7 +240,7 @@
       </p:grpSpPr>
       <p:sp>
         <p:nvSpPr>
-          <p:cNvPr id="177" name="PlaceHolder 1"/>
+          <p:cNvPr id="176" name="PlaceHolder 1"/>
           <p:cNvSpPr>
             <a:spLocks noGrp="1"/>
           </p:cNvSpPr>
@@ -251,7 +251,7 @@
         <p:spPr>
           <a:xfrm>
             <a:off x="685800" y="4400640"/>
-            <a:ext cx="5485680" cy="3599640"/>
+            <a:ext cx="5485320" cy="3599280"/>
           </a:xfrm>
           <a:prstGeom prst="rect">
             <a:avLst/>
@@ -266,14 +266,14 @@
       </p:sp>
       <p:sp>
         <p:nvSpPr>
-          <p:cNvPr id="178" name="CustomShape 2"/>
+          <p:cNvPr id="177" name="CustomShape 2"/>
           <p:cNvSpPr/>
           <p:nvPr/>
         </p:nvSpPr>
         <p:spPr>
           <a:xfrm>
             <a:off x="3884760" y="8685360"/>
-            <a:ext cx="2971080" cy="457920"/>
+            <a:ext cx="2970720" cy="457560"/>
           </a:xfrm>
           <a:prstGeom prst="rect">
             <a:avLst/>
@@ -297,7 +297,7 @@
                 <a:spcPct val="100000"/>
               </a:lnSpc>
             </a:pPr>
-            <a:fld id="{CD1D427E-6C71-4C8F-AEE8-DC2BF9608CD2}" type="slidenum">
+            <a:fld id="{953E2C3C-D03F-4DCA-85E1-09AF29D37893}" type="slidenum">
               <a:rPr lang="en-GB" sz="1200" spc="-1" strike="noStrike">
                 <a:solidFill>
                   <a:srgbClr val="000000"/>
@@ -340,7 +340,7 @@
       </p:grpSpPr>
       <p:sp>
         <p:nvSpPr>
-          <p:cNvPr id="179" name="PlaceHolder 1"/>
+          <p:cNvPr id="178" name="PlaceHolder 1"/>
           <p:cNvSpPr>
             <a:spLocks noGrp="1"/>
           </p:cNvSpPr>
@@ -351,7 +351,7 @@
         <p:spPr>
           <a:xfrm>
             <a:off x="685800" y="4400640"/>
-            <a:ext cx="5485680" cy="3599640"/>
+            <a:ext cx="5485320" cy="3599280"/>
           </a:xfrm>
           <a:prstGeom prst="rect">
             <a:avLst/>
@@ -366,14 +366,14 @@
       </p:sp>
       <p:sp>
         <p:nvSpPr>
-          <p:cNvPr id="180" name="CustomShape 2"/>
+          <p:cNvPr id="179" name="CustomShape 2"/>
           <p:cNvSpPr/>
           <p:nvPr/>
         </p:nvSpPr>
         <p:spPr>
           <a:xfrm>
             <a:off x="3884760" y="8685360"/>
-            <a:ext cx="2971080" cy="457920"/>
+            <a:ext cx="2970720" cy="457560"/>
           </a:xfrm>
           <a:prstGeom prst="rect">
             <a:avLst/>
@@ -397,7 +397,7 @@
                 <a:spcPct val="100000"/>
               </a:lnSpc>
             </a:pPr>
-            <a:fld id="{B26B38D6-E3B5-476C-889C-9DF9DFD898C9}" type="slidenum">
+            <a:fld id="{3A7C936A-96FC-4709-A194-36261B85BCD8}" type="slidenum">
               <a:rPr lang="en-GB" sz="1200" spc="-1" strike="noStrike">
                 <a:solidFill>
                   <a:srgbClr val="000000"/>
@@ -462,7 +462,7 @@
       </p:grpSpPr>
       <p:sp>
         <p:nvSpPr>
-          <p:cNvPr id="24" name="PlaceHolder 1"/>
+          <p:cNvPr id="23" name="PlaceHolder 1"/>
           <p:cNvSpPr>
             <a:spLocks noGrp="1"/>
           </p:cNvSpPr>
@@ -473,7 +473,7 @@
         <p:spPr>
           <a:xfrm>
             <a:off x="1523880" y="1122480"/>
-            <a:ext cx="9143280" cy="2386800"/>
+            <a:ext cx="9142920" cy="2386440"/>
           </a:xfrm>
           <a:prstGeom prst="rect">
             <a:avLst/>
@@ -489,7 +489,7 @@
       </p:sp>
       <p:sp>
         <p:nvSpPr>
-          <p:cNvPr id="25" name="PlaceHolder 2"/>
+          <p:cNvPr id="24" name="PlaceHolder 2"/>
           <p:cNvSpPr>
             <a:spLocks noGrp="1"/>
           </p:cNvSpPr>
@@ -500,7 +500,7 @@
         <p:spPr>
           <a:xfrm>
             <a:off x="1523880" y="3602160"/>
-            <a:ext cx="9143280" cy="789120"/>
+            <a:ext cx="9142920" cy="789120"/>
           </a:xfrm>
           <a:prstGeom prst="rect">
             <a:avLst/>
@@ -515,7 +515,7 @@
       </p:sp>
       <p:sp>
         <p:nvSpPr>
-          <p:cNvPr id="26" name="PlaceHolder 3"/>
+          <p:cNvPr id="25" name="PlaceHolder 3"/>
           <p:cNvSpPr>
             <a:spLocks noGrp="1"/>
           </p:cNvSpPr>
@@ -526,7 +526,7 @@
         <p:spPr>
           <a:xfrm>
             <a:off x="1523880" y="4466520"/>
-            <a:ext cx="9143280" cy="789120"/>
+            <a:ext cx="9142920" cy="789120"/>
           </a:xfrm>
           <a:prstGeom prst="rect">
             <a:avLst/>
@@ -563,7 +563,7 @@
       </p:grpSpPr>
       <p:sp>
         <p:nvSpPr>
-          <p:cNvPr id="27" name="PlaceHolder 1"/>
+          <p:cNvPr id="26" name="PlaceHolder 1"/>
           <p:cNvSpPr>
             <a:spLocks noGrp="1"/>
           </p:cNvSpPr>
@@ -574,7 +574,7 @@
         <p:spPr>
           <a:xfrm>
             <a:off x="1523880" y="1122480"/>
-            <a:ext cx="9143280" cy="2386800"/>
+            <a:ext cx="9142920" cy="2386440"/>
           </a:xfrm>
           <a:prstGeom prst="rect">
             <a:avLst/>
@@ -590,7 +590,7 @@
       </p:sp>
       <p:sp>
         <p:nvSpPr>
-          <p:cNvPr id="28" name="PlaceHolder 2"/>
+          <p:cNvPr id="27" name="PlaceHolder 2"/>
           <p:cNvSpPr>
             <a:spLocks noGrp="1"/>
           </p:cNvSpPr>
@@ -601,7 +601,7 @@
         <p:spPr>
           <a:xfrm>
             <a:off x="1523880" y="3602160"/>
-            <a:ext cx="4461840" cy="789120"/>
+            <a:ext cx="4461480" cy="789120"/>
           </a:xfrm>
           <a:prstGeom prst="rect">
             <a:avLst/>
@@ -616,7 +616,7 @@
       </p:sp>
       <p:sp>
         <p:nvSpPr>
-          <p:cNvPr id="29" name="PlaceHolder 3"/>
+          <p:cNvPr id="28" name="PlaceHolder 3"/>
           <p:cNvSpPr>
             <a:spLocks noGrp="1"/>
           </p:cNvSpPr>
@@ -626,8 +626,8 @@
         </p:nvSpPr>
         <p:spPr>
           <a:xfrm>
-            <a:off x="6209280" y="3602160"/>
-            <a:ext cx="4461840" cy="789120"/>
+            <a:off x="6208920" y="3602160"/>
+            <a:ext cx="4461480" cy="789120"/>
           </a:xfrm>
           <a:prstGeom prst="rect">
             <a:avLst/>
@@ -642,7 +642,7 @@
       </p:sp>
       <p:sp>
         <p:nvSpPr>
-          <p:cNvPr id="30" name="PlaceHolder 4"/>
+          <p:cNvPr id="29" name="PlaceHolder 4"/>
           <p:cNvSpPr>
             <a:spLocks noGrp="1"/>
           </p:cNvSpPr>
@@ -652,8 +652,8 @@
         </p:nvSpPr>
         <p:spPr>
           <a:xfrm>
-            <a:off x="6209280" y="4466520"/>
-            <a:ext cx="4461840" cy="789120"/>
+            <a:off x="6208920" y="4466520"/>
+            <a:ext cx="4461480" cy="789120"/>
           </a:xfrm>
           <a:prstGeom prst="rect">
             <a:avLst/>
@@ -668,7 +668,7 @@
       </p:sp>
       <p:sp>
         <p:nvSpPr>
-          <p:cNvPr id="31" name="PlaceHolder 5"/>
+          <p:cNvPr id="30" name="PlaceHolder 5"/>
           <p:cNvSpPr>
             <a:spLocks noGrp="1"/>
           </p:cNvSpPr>
@@ -679,7 +679,7 @@
         <p:spPr>
           <a:xfrm>
             <a:off x="1523880" y="4466520"/>
-            <a:ext cx="4461840" cy="789120"/>
+            <a:ext cx="4461480" cy="789120"/>
           </a:xfrm>
           <a:prstGeom prst="rect">
             <a:avLst/>
@@ -716,7 +716,7 @@
       </p:grpSpPr>
       <p:sp>
         <p:nvSpPr>
-          <p:cNvPr id="32" name="PlaceHolder 1"/>
+          <p:cNvPr id="31" name="PlaceHolder 1"/>
           <p:cNvSpPr>
             <a:spLocks noGrp="1"/>
           </p:cNvSpPr>
@@ -727,7 +727,7 @@
         <p:spPr>
           <a:xfrm>
             <a:off x="1523880" y="1122480"/>
-            <a:ext cx="9143280" cy="2386800"/>
+            <a:ext cx="9142920" cy="2386440"/>
           </a:xfrm>
           <a:prstGeom prst="rect">
             <a:avLst/>
@@ -743,7 +743,7 @@
       </p:sp>
       <p:sp>
         <p:nvSpPr>
-          <p:cNvPr id="33" name="PlaceHolder 2"/>
+          <p:cNvPr id="32" name="PlaceHolder 2"/>
           <p:cNvSpPr>
             <a:spLocks noGrp="1"/>
           </p:cNvSpPr>
@@ -754,7 +754,7 @@
         <p:spPr>
           <a:xfrm>
             <a:off x="1523880" y="3602160"/>
-            <a:ext cx="9143280" cy="1654920"/>
+            <a:ext cx="9142920" cy="1654560"/>
           </a:xfrm>
           <a:prstGeom prst="rect">
             <a:avLst/>
@@ -769,7 +769,7 @@
       </p:sp>
       <p:sp>
         <p:nvSpPr>
-          <p:cNvPr id="34" name="PlaceHolder 3"/>
+          <p:cNvPr id="33" name="PlaceHolder 3"/>
           <p:cNvSpPr>
             <a:spLocks noGrp="1"/>
           </p:cNvSpPr>
@@ -780,7 +780,7 @@
         <p:spPr>
           <a:xfrm>
             <a:off x="1523880" y="3602160"/>
-            <a:ext cx="9143280" cy="1654920"/>
+            <a:ext cx="9142920" cy="1654560"/>
           </a:xfrm>
           <a:prstGeom prst="rect">
             <a:avLst/>
@@ -793,6 +793,29 @@
           </a:p>
         </p:txBody>
       </p:sp>
+      <p:pic>
+        <p:nvPicPr>
+          <p:cNvPr id="34" name="" descr=""/>
+          <p:cNvPicPr/>
+          <p:nvPr/>
+        </p:nvPicPr>
+        <p:blipFill>
+          <a:blip r:embed="rId2"/>
+          <a:stretch/>
+        </p:blipFill>
+        <p:spPr>
+          <a:xfrm>
+            <a:off x="5058360" y="3602160"/>
+            <a:ext cx="2073600" cy="1654560"/>
+          </a:xfrm>
+          <a:prstGeom prst="rect">
+            <a:avLst/>
+          </a:prstGeom>
+          <a:ln>
+            <a:noFill/>
+          </a:ln>
+        </p:spPr>
+      </p:pic>
       <p:pic>
         <p:nvPicPr>
           <p:cNvPr id="35" name="" descr=""/>
@@ -800,36 +823,13 @@
           <p:nvPr/>
         </p:nvPicPr>
         <p:blipFill>
-          <a:blip r:embed="rId2"/>
-          <a:stretch/>
-        </p:blipFill>
-        <p:spPr>
-          <a:xfrm>
-            <a:off x="5058360" y="3601800"/>
-            <a:ext cx="2073960" cy="1654920"/>
-          </a:xfrm>
-          <a:prstGeom prst="rect">
-            <a:avLst/>
-          </a:prstGeom>
-          <a:ln>
-            <a:noFill/>
-          </a:ln>
-        </p:spPr>
-      </p:pic>
-      <p:pic>
-        <p:nvPicPr>
-          <p:cNvPr id="36" name="" descr=""/>
-          <p:cNvPicPr/>
-          <p:nvPr/>
-        </p:nvPicPr>
-        <p:blipFill>
           <a:blip r:embed="rId3"/>
           <a:stretch/>
         </p:blipFill>
         <p:spPr>
           <a:xfrm>
-            <a:off x="5058360" y="3601800"/>
-            <a:ext cx="2073960" cy="1654920"/>
+            <a:off x="5058360" y="3602160"/>
+            <a:ext cx="2073600" cy="1654560"/>
           </a:xfrm>
           <a:prstGeom prst="rect">
             <a:avLst/>
@@ -885,7 +885,7 @@
       </p:grpSpPr>
       <p:sp>
         <p:nvSpPr>
-          <p:cNvPr id="39" name="PlaceHolder 1"/>
+          <p:cNvPr id="38" name="PlaceHolder 1"/>
           <p:cNvSpPr>
             <a:spLocks noGrp="1"/>
           </p:cNvSpPr>
@@ -896,7 +896,7 @@
         <p:spPr>
           <a:xfrm>
             <a:off x="1523880" y="1122480"/>
-            <a:ext cx="9143280" cy="2386800"/>
+            <a:ext cx="9142920" cy="2386440"/>
           </a:xfrm>
           <a:prstGeom prst="rect">
             <a:avLst/>
@@ -912,7 +912,7 @@
       </p:sp>
       <p:sp>
         <p:nvSpPr>
-          <p:cNvPr id="40" name="PlaceHolder 2"/>
+          <p:cNvPr id="39" name="PlaceHolder 2"/>
           <p:cNvSpPr>
             <a:spLocks noGrp="1"/>
           </p:cNvSpPr>
@@ -923,7 +923,7 @@
         <p:spPr>
           <a:xfrm>
             <a:off x="1523880" y="3602160"/>
-            <a:ext cx="9143280" cy="1654920"/>
+            <a:ext cx="9142920" cy="1654560"/>
           </a:xfrm>
           <a:prstGeom prst="rect">
             <a:avLst/>
@@ -961,7 +961,7 @@
       </p:grpSpPr>
       <p:sp>
         <p:nvSpPr>
-          <p:cNvPr id="41" name="PlaceHolder 1"/>
+          <p:cNvPr id="40" name="PlaceHolder 1"/>
           <p:cNvSpPr>
             <a:spLocks noGrp="1"/>
           </p:cNvSpPr>
@@ -972,7 +972,7 @@
         <p:spPr>
           <a:xfrm>
             <a:off x="1523880" y="1122480"/>
-            <a:ext cx="9143280" cy="2386800"/>
+            <a:ext cx="9142920" cy="2386440"/>
           </a:xfrm>
           <a:prstGeom prst="rect">
             <a:avLst/>
@@ -988,7 +988,7 @@
       </p:sp>
       <p:sp>
         <p:nvSpPr>
-          <p:cNvPr id="42" name="PlaceHolder 2"/>
+          <p:cNvPr id="41" name="PlaceHolder 2"/>
           <p:cNvSpPr>
             <a:spLocks noGrp="1"/>
           </p:cNvSpPr>
@@ -999,7 +999,7 @@
         <p:spPr>
           <a:xfrm>
             <a:off x="1523880" y="3602160"/>
-            <a:ext cx="9143280" cy="1654920"/>
+            <a:ext cx="9142920" cy="1654560"/>
           </a:xfrm>
           <a:prstGeom prst="rect">
             <a:avLst/>
@@ -1036,7 +1036,7 @@
       </p:grpSpPr>
       <p:sp>
         <p:nvSpPr>
-          <p:cNvPr id="43" name="PlaceHolder 1"/>
+          <p:cNvPr id="42" name="PlaceHolder 1"/>
           <p:cNvSpPr>
             <a:spLocks noGrp="1"/>
           </p:cNvSpPr>
@@ -1047,7 +1047,7 @@
         <p:spPr>
           <a:xfrm>
             <a:off x="1523880" y="1122480"/>
-            <a:ext cx="9143280" cy="2386800"/>
+            <a:ext cx="9142920" cy="2386440"/>
           </a:xfrm>
           <a:prstGeom prst="rect">
             <a:avLst/>
@@ -1063,7 +1063,7 @@
       </p:sp>
       <p:sp>
         <p:nvSpPr>
-          <p:cNvPr id="44" name="PlaceHolder 2"/>
+          <p:cNvPr id="43" name="PlaceHolder 2"/>
           <p:cNvSpPr>
             <a:spLocks noGrp="1"/>
           </p:cNvSpPr>
@@ -1074,7 +1074,7 @@
         <p:spPr>
           <a:xfrm>
             <a:off x="1523880" y="3602160"/>
-            <a:ext cx="4461840" cy="1654920"/>
+            <a:ext cx="4461480" cy="1654560"/>
           </a:xfrm>
           <a:prstGeom prst="rect">
             <a:avLst/>
@@ -1089,7 +1089,7 @@
       </p:sp>
       <p:sp>
         <p:nvSpPr>
-          <p:cNvPr id="45" name="PlaceHolder 3"/>
+          <p:cNvPr id="44" name="PlaceHolder 3"/>
           <p:cNvSpPr>
             <a:spLocks noGrp="1"/>
           </p:cNvSpPr>
@@ -1099,8 +1099,8 @@
         </p:nvSpPr>
         <p:spPr>
           <a:xfrm>
-            <a:off x="6209280" y="3602160"/>
-            <a:ext cx="4461840" cy="1654920"/>
+            <a:off x="6208920" y="3602160"/>
+            <a:ext cx="4461480" cy="1654560"/>
           </a:xfrm>
           <a:prstGeom prst="rect">
             <a:avLst/>
@@ -1137,7 +1137,7 @@
       </p:grpSpPr>
       <p:sp>
         <p:nvSpPr>
-          <p:cNvPr id="46" name="PlaceHolder 1"/>
+          <p:cNvPr id="45" name="PlaceHolder 1"/>
           <p:cNvSpPr>
             <a:spLocks noGrp="1"/>
           </p:cNvSpPr>
@@ -1148,7 +1148,7 @@
         <p:spPr>
           <a:xfrm>
             <a:off x="1523880" y="1122480"/>
-            <a:ext cx="9143280" cy="2386800"/>
+            <a:ext cx="9142920" cy="2386440"/>
           </a:xfrm>
           <a:prstGeom prst="rect">
             <a:avLst/>
@@ -1186,7 +1186,7 @@
       </p:grpSpPr>
       <p:sp>
         <p:nvSpPr>
-          <p:cNvPr id="47" name="PlaceHolder 1"/>
+          <p:cNvPr id="46" name="PlaceHolder 1"/>
           <p:cNvSpPr>
             <a:spLocks noGrp="1"/>
           </p:cNvSpPr>
@@ -1197,7 +1197,7 @@
         <p:spPr>
           <a:xfrm>
             <a:off x="1523880" y="1122480"/>
-            <a:ext cx="9143280" cy="11064960"/>
+            <a:ext cx="9142920" cy="11063520"/>
           </a:xfrm>
           <a:prstGeom prst="rect">
             <a:avLst/>
@@ -1235,7 +1235,7 @@
       </p:grpSpPr>
       <p:sp>
         <p:nvSpPr>
-          <p:cNvPr id="48" name="PlaceHolder 1"/>
+          <p:cNvPr id="47" name="PlaceHolder 1"/>
           <p:cNvSpPr>
             <a:spLocks noGrp="1"/>
           </p:cNvSpPr>
@@ -1246,7 +1246,7 @@
         <p:spPr>
           <a:xfrm>
             <a:off x="1523880" y="1122480"/>
-            <a:ext cx="9143280" cy="2386800"/>
+            <a:ext cx="9142920" cy="2386440"/>
           </a:xfrm>
           <a:prstGeom prst="rect">
             <a:avLst/>
@@ -1262,7 +1262,7 @@
       </p:sp>
       <p:sp>
         <p:nvSpPr>
-          <p:cNvPr id="49" name="PlaceHolder 2"/>
+          <p:cNvPr id="48" name="PlaceHolder 2"/>
           <p:cNvSpPr>
             <a:spLocks noGrp="1"/>
           </p:cNvSpPr>
@@ -1273,7 +1273,7 @@
         <p:spPr>
           <a:xfrm>
             <a:off x="1523880" y="3602160"/>
-            <a:ext cx="4461840" cy="789120"/>
+            <a:ext cx="4461480" cy="789120"/>
           </a:xfrm>
           <a:prstGeom prst="rect">
             <a:avLst/>
@@ -1288,7 +1288,7 @@
       </p:sp>
       <p:sp>
         <p:nvSpPr>
-          <p:cNvPr id="50" name="PlaceHolder 3"/>
+          <p:cNvPr id="49" name="PlaceHolder 3"/>
           <p:cNvSpPr>
             <a:spLocks noGrp="1"/>
           </p:cNvSpPr>
@@ -1299,7 +1299,7 @@
         <p:spPr>
           <a:xfrm>
             <a:off x="1523880" y="4466520"/>
-            <a:ext cx="4461840" cy="789120"/>
+            <a:ext cx="4461480" cy="789120"/>
           </a:xfrm>
           <a:prstGeom prst="rect">
             <a:avLst/>
@@ -1314,7 +1314,7 @@
       </p:sp>
       <p:sp>
         <p:nvSpPr>
-          <p:cNvPr id="51" name="PlaceHolder 4"/>
+          <p:cNvPr id="50" name="PlaceHolder 4"/>
           <p:cNvSpPr>
             <a:spLocks noGrp="1"/>
           </p:cNvSpPr>
@@ -1324,8 +1324,8 @@
         </p:nvSpPr>
         <p:spPr>
           <a:xfrm>
-            <a:off x="6209280" y="3602160"/>
-            <a:ext cx="4461840" cy="1654920"/>
+            <a:off x="6208920" y="3602160"/>
+            <a:ext cx="4461480" cy="1654560"/>
           </a:xfrm>
           <a:prstGeom prst="rect">
             <a:avLst/>
@@ -1362,7 +1362,7 @@
       </p:grpSpPr>
       <p:sp>
         <p:nvSpPr>
-          <p:cNvPr id="3" name="PlaceHolder 1"/>
+          <p:cNvPr id="2" name="PlaceHolder 1"/>
           <p:cNvSpPr>
             <a:spLocks noGrp="1"/>
           </p:cNvSpPr>
@@ -1373,7 +1373,7 @@
         <p:spPr>
           <a:xfrm>
             <a:off x="1523880" y="1122480"/>
-            <a:ext cx="9143280" cy="2386800"/>
+            <a:ext cx="9142920" cy="2386440"/>
           </a:xfrm>
           <a:prstGeom prst="rect">
             <a:avLst/>
@@ -1389,7 +1389,7 @@
       </p:sp>
       <p:sp>
         <p:nvSpPr>
-          <p:cNvPr id="4" name="PlaceHolder 2"/>
+          <p:cNvPr id="3" name="PlaceHolder 2"/>
           <p:cNvSpPr>
             <a:spLocks noGrp="1"/>
           </p:cNvSpPr>
@@ -1400,7 +1400,7 @@
         <p:spPr>
           <a:xfrm>
             <a:off x="1523880" y="3602160"/>
-            <a:ext cx="9143280" cy="1654920"/>
+            <a:ext cx="9142920" cy="1654560"/>
           </a:xfrm>
           <a:prstGeom prst="rect">
             <a:avLst/>
@@ -1438,7 +1438,7 @@
       </p:grpSpPr>
       <p:sp>
         <p:nvSpPr>
-          <p:cNvPr id="52" name="PlaceHolder 1"/>
+          <p:cNvPr id="51" name="PlaceHolder 1"/>
           <p:cNvSpPr>
             <a:spLocks noGrp="1"/>
           </p:cNvSpPr>
@@ -1449,7 +1449,7 @@
         <p:spPr>
           <a:xfrm>
             <a:off x="1523880" y="1122480"/>
-            <a:ext cx="9143280" cy="2386800"/>
+            <a:ext cx="9142920" cy="2386440"/>
           </a:xfrm>
           <a:prstGeom prst="rect">
             <a:avLst/>
@@ -1465,7 +1465,7 @@
       </p:sp>
       <p:sp>
         <p:nvSpPr>
-          <p:cNvPr id="53" name="PlaceHolder 2"/>
+          <p:cNvPr id="52" name="PlaceHolder 2"/>
           <p:cNvSpPr>
             <a:spLocks noGrp="1"/>
           </p:cNvSpPr>
@@ -1476,7 +1476,7 @@
         <p:spPr>
           <a:xfrm>
             <a:off x="1523880" y="3602160"/>
-            <a:ext cx="4461840" cy="1654920"/>
+            <a:ext cx="4461480" cy="1654560"/>
           </a:xfrm>
           <a:prstGeom prst="rect">
             <a:avLst/>
@@ -1491,7 +1491,7 @@
       </p:sp>
       <p:sp>
         <p:nvSpPr>
-          <p:cNvPr id="54" name="PlaceHolder 3"/>
+          <p:cNvPr id="53" name="PlaceHolder 3"/>
           <p:cNvSpPr>
             <a:spLocks noGrp="1"/>
           </p:cNvSpPr>
@@ -1501,8 +1501,8 @@
         </p:nvSpPr>
         <p:spPr>
           <a:xfrm>
-            <a:off x="6209280" y="3602160"/>
-            <a:ext cx="4461840" cy="789120"/>
+            <a:off x="6208920" y="3602160"/>
+            <a:ext cx="4461480" cy="789120"/>
           </a:xfrm>
           <a:prstGeom prst="rect">
             <a:avLst/>
@@ -1517,7 +1517,7 @@
       </p:sp>
       <p:sp>
         <p:nvSpPr>
-          <p:cNvPr id="55" name="PlaceHolder 4"/>
+          <p:cNvPr id="54" name="PlaceHolder 4"/>
           <p:cNvSpPr>
             <a:spLocks noGrp="1"/>
           </p:cNvSpPr>
@@ -1527,8 +1527,8 @@
         </p:nvSpPr>
         <p:spPr>
           <a:xfrm>
-            <a:off x="6209280" y="4466520"/>
-            <a:ext cx="4461840" cy="789120"/>
+            <a:off x="6208920" y="4466520"/>
+            <a:ext cx="4461480" cy="789120"/>
           </a:xfrm>
           <a:prstGeom prst="rect">
             <a:avLst/>
@@ -1565,7 +1565,7 @@
       </p:grpSpPr>
       <p:sp>
         <p:nvSpPr>
-          <p:cNvPr id="56" name="PlaceHolder 1"/>
+          <p:cNvPr id="55" name="PlaceHolder 1"/>
           <p:cNvSpPr>
             <a:spLocks noGrp="1"/>
           </p:cNvSpPr>
@@ -1576,7 +1576,7 @@
         <p:spPr>
           <a:xfrm>
             <a:off x="1523880" y="1122480"/>
-            <a:ext cx="9143280" cy="2386800"/>
+            <a:ext cx="9142920" cy="2386440"/>
           </a:xfrm>
           <a:prstGeom prst="rect">
             <a:avLst/>
@@ -1592,7 +1592,7 @@
       </p:sp>
       <p:sp>
         <p:nvSpPr>
-          <p:cNvPr id="57" name="PlaceHolder 2"/>
+          <p:cNvPr id="56" name="PlaceHolder 2"/>
           <p:cNvSpPr>
             <a:spLocks noGrp="1"/>
           </p:cNvSpPr>
@@ -1603,7 +1603,7 @@
         <p:spPr>
           <a:xfrm>
             <a:off x="1523880" y="3602160"/>
-            <a:ext cx="4461840" cy="789120"/>
+            <a:ext cx="4461480" cy="789120"/>
           </a:xfrm>
           <a:prstGeom prst="rect">
             <a:avLst/>
@@ -1618,7 +1618,7 @@
       </p:sp>
       <p:sp>
         <p:nvSpPr>
-          <p:cNvPr id="58" name="PlaceHolder 3"/>
+          <p:cNvPr id="57" name="PlaceHolder 3"/>
           <p:cNvSpPr>
             <a:spLocks noGrp="1"/>
           </p:cNvSpPr>
@@ -1628,8 +1628,8 @@
         </p:nvSpPr>
         <p:spPr>
           <a:xfrm>
-            <a:off x="6209280" y="3602160"/>
-            <a:ext cx="4461840" cy="789120"/>
+            <a:off x="6208920" y="3602160"/>
+            <a:ext cx="4461480" cy="789120"/>
           </a:xfrm>
           <a:prstGeom prst="rect">
             <a:avLst/>
@@ -1644,7 +1644,7 @@
       </p:sp>
       <p:sp>
         <p:nvSpPr>
-          <p:cNvPr id="59" name="PlaceHolder 4"/>
+          <p:cNvPr id="58" name="PlaceHolder 4"/>
           <p:cNvSpPr>
             <a:spLocks noGrp="1"/>
           </p:cNvSpPr>
@@ -1655,7 +1655,7 @@
         <p:spPr>
           <a:xfrm>
             <a:off x="1523880" y="4466520"/>
-            <a:ext cx="9143280" cy="789120"/>
+            <a:ext cx="9142920" cy="789120"/>
           </a:xfrm>
           <a:prstGeom prst="rect">
             <a:avLst/>
@@ -1692,7 +1692,7 @@
       </p:grpSpPr>
       <p:sp>
         <p:nvSpPr>
-          <p:cNvPr id="60" name="PlaceHolder 1"/>
+          <p:cNvPr id="59" name="PlaceHolder 1"/>
           <p:cNvSpPr>
             <a:spLocks noGrp="1"/>
           </p:cNvSpPr>
@@ -1703,7 +1703,7 @@
         <p:spPr>
           <a:xfrm>
             <a:off x="1523880" y="1122480"/>
-            <a:ext cx="9143280" cy="2386800"/>
+            <a:ext cx="9142920" cy="2386440"/>
           </a:xfrm>
           <a:prstGeom prst="rect">
             <a:avLst/>
@@ -1719,7 +1719,7 @@
       </p:sp>
       <p:sp>
         <p:nvSpPr>
-          <p:cNvPr id="61" name="PlaceHolder 2"/>
+          <p:cNvPr id="60" name="PlaceHolder 2"/>
           <p:cNvSpPr>
             <a:spLocks noGrp="1"/>
           </p:cNvSpPr>
@@ -1730,7 +1730,7 @@
         <p:spPr>
           <a:xfrm>
             <a:off x="1523880" y="3602160"/>
-            <a:ext cx="9143280" cy="789120"/>
+            <a:ext cx="9142920" cy="789120"/>
           </a:xfrm>
           <a:prstGeom prst="rect">
             <a:avLst/>
@@ -1745,7 +1745,7 @@
       </p:sp>
       <p:sp>
         <p:nvSpPr>
-          <p:cNvPr id="62" name="PlaceHolder 3"/>
+          <p:cNvPr id="61" name="PlaceHolder 3"/>
           <p:cNvSpPr>
             <a:spLocks noGrp="1"/>
           </p:cNvSpPr>
@@ -1756,7 +1756,7 @@
         <p:spPr>
           <a:xfrm>
             <a:off x="1523880" y="4466520"/>
-            <a:ext cx="9143280" cy="789120"/>
+            <a:ext cx="9142920" cy="789120"/>
           </a:xfrm>
           <a:prstGeom prst="rect">
             <a:avLst/>
@@ -1793,7 +1793,7 @@
       </p:grpSpPr>
       <p:sp>
         <p:nvSpPr>
-          <p:cNvPr id="63" name="PlaceHolder 1"/>
+          <p:cNvPr id="62" name="PlaceHolder 1"/>
           <p:cNvSpPr>
             <a:spLocks noGrp="1"/>
           </p:cNvSpPr>
@@ -1804,7 +1804,7 @@
         <p:spPr>
           <a:xfrm>
             <a:off x="1523880" y="1122480"/>
-            <a:ext cx="9143280" cy="2386800"/>
+            <a:ext cx="9142920" cy="2386440"/>
           </a:xfrm>
           <a:prstGeom prst="rect">
             <a:avLst/>
@@ -1820,7 +1820,7 @@
       </p:sp>
       <p:sp>
         <p:nvSpPr>
-          <p:cNvPr id="64" name="PlaceHolder 2"/>
+          <p:cNvPr id="63" name="PlaceHolder 2"/>
           <p:cNvSpPr>
             <a:spLocks noGrp="1"/>
           </p:cNvSpPr>
@@ -1831,7 +1831,7 @@
         <p:spPr>
           <a:xfrm>
             <a:off x="1523880" y="3602160"/>
-            <a:ext cx="4461840" cy="789120"/>
+            <a:ext cx="4461480" cy="789120"/>
           </a:xfrm>
           <a:prstGeom prst="rect">
             <a:avLst/>
@@ -1846,7 +1846,7 @@
       </p:sp>
       <p:sp>
         <p:nvSpPr>
-          <p:cNvPr id="65" name="PlaceHolder 3"/>
+          <p:cNvPr id="64" name="PlaceHolder 3"/>
           <p:cNvSpPr>
             <a:spLocks noGrp="1"/>
           </p:cNvSpPr>
@@ -1856,8 +1856,8 @@
         </p:nvSpPr>
         <p:spPr>
           <a:xfrm>
-            <a:off x="6209280" y="3602160"/>
-            <a:ext cx="4461840" cy="789120"/>
+            <a:off x="6208920" y="3602160"/>
+            <a:ext cx="4461480" cy="789120"/>
           </a:xfrm>
           <a:prstGeom prst="rect">
             <a:avLst/>
@@ -1872,7 +1872,7 @@
       </p:sp>
       <p:sp>
         <p:nvSpPr>
-          <p:cNvPr id="66" name="PlaceHolder 4"/>
+          <p:cNvPr id="65" name="PlaceHolder 4"/>
           <p:cNvSpPr>
             <a:spLocks noGrp="1"/>
           </p:cNvSpPr>
@@ -1882,8 +1882,8 @@
         </p:nvSpPr>
         <p:spPr>
           <a:xfrm>
-            <a:off x="6209280" y="4466520"/>
-            <a:ext cx="4461840" cy="789120"/>
+            <a:off x="6208920" y="4466520"/>
+            <a:ext cx="4461480" cy="789120"/>
           </a:xfrm>
           <a:prstGeom prst="rect">
             <a:avLst/>
@@ -1898,7 +1898,7 @@
       </p:sp>
       <p:sp>
         <p:nvSpPr>
-          <p:cNvPr id="67" name="PlaceHolder 5"/>
+          <p:cNvPr id="66" name="PlaceHolder 5"/>
           <p:cNvSpPr>
             <a:spLocks noGrp="1"/>
           </p:cNvSpPr>
@@ -1909,7 +1909,7 @@
         <p:spPr>
           <a:xfrm>
             <a:off x="1523880" y="4466520"/>
-            <a:ext cx="4461840" cy="789120"/>
+            <a:ext cx="4461480" cy="789120"/>
           </a:xfrm>
           <a:prstGeom prst="rect">
             <a:avLst/>
@@ -1946,7 +1946,7 @@
       </p:grpSpPr>
       <p:sp>
         <p:nvSpPr>
-          <p:cNvPr id="68" name="PlaceHolder 1"/>
+          <p:cNvPr id="67" name="PlaceHolder 1"/>
           <p:cNvSpPr>
             <a:spLocks noGrp="1"/>
           </p:cNvSpPr>
@@ -1957,7 +1957,7 @@
         <p:spPr>
           <a:xfrm>
             <a:off x="1523880" y="1122480"/>
-            <a:ext cx="9143280" cy="2386800"/>
+            <a:ext cx="9142920" cy="2386440"/>
           </a:xfrm>
           <a:prstGeom prst="rect">
             <a:avLst/>
@@ -1973,7 +1973,7 @@
       </p:sp>
       <p:sp>
         <p:nvSpPr>
-          <p:cNvPr id="69" name="PlaceHolder 2"/>
+          <p:cNvPr id="68" name="PlaceHolder 2"/>
           <p:cNvSpPr>
             <a:spLocks noGrp="1"/>
           </p:cNvSpPr>
@@ -1984,7 +1984,7 @@
         <p:spPr>
           <a:xfrm>
             <a:off x="1523880" y="3602160"/>
-            <a:ext cx="9143280" cy="1654920"/>
+            <a:ext cx="9142920" cy="1654560"/>
           </a:xfrm>
           <a:prstGeom prst="rect">
             <a:avLst/>
@@ -1999,7 +1999,7 @@
       </p:sp>
       <p:sp>
         <p:nvSpPr>
-          <p:cNvPr id="70" name="PlaceHolder 3"/>
+          <p:cNvPr id="69" name="PlaceHolder 3"/>
           <p:cNvSpPr>
             <a:spLocks noGrp="1"/>
           </p:cNvSpPr>
@@ -2010,7 +2010,7 @@
         <p:spPr>
           <a:xfrm>
             <a:off x="1523880" y="3602160"/>
-            <a:ext cx="9143280" cy="1654920"/>
+            <a:ext cx="9142920" cy="1654560"/>
           </a:xfrm>
           <a:prstGeom prst="rect">
             <a:avLst/>
@@ -2023,6 +2023,29 @@
           </a:p>
         </p:txBody>
       </p:sp>
+      <p:pic>
+        <p:nvPicPr>
+          <p:cNvPr id="70" name="" descr=""/>
+          <p:cNvPicPr/>
+          <p:nvPr/>
+        </p:nvPicPr>
+        <p:blipFill>
+          <a:blip r:embed="rId2"/>
+          <a:stretch/>
+        </p:blipFill>
+        <p:spPr>
+          <a:xfrm>
+            <a:off x="5058360" y="3602160"/>
+            <a:ext cx="2073600" cy="1654560"/>
+          </a:xfrm>
+          <a:prstGeom prst="rect">
+            <a:avLst/>
+          </a:prstGeom>
+          <a:ln>
+            <a:noFill/>
+          </a:ln>
+        </p:spPr>
+      </p:pic>
       <p:pic>
         <p:nvPicPr>
           <p:cNvPr id="71" name="" descr=""/>
@@ -2030,36 +2053,13 @@
           <p:nvPr/>
         </p:nvPicPr>
         <p:blipFill>
-          <a:blip r:embed="rId2"/>
-          <a:stretch/>
-        </p:blipFill>
-        <p:spPr>
-          <a:xfrm>
-            <a:off x="5058360" y="3601800"/>
-            <a:ext cx="2073960" cy="1654920"/>
-          </a:xfrm>
-          <a:prstGeom prst="rect">
-            <a:avLst/>
-          </a:prstGeom>
-          <a:ln>
-            <a:noFill/>
-          </a:ln>
-        </p:spPr>
-      </p:pic>
-      <p:pic>
-        <p:nvPicPr>
-          <p:cNvPr id="72" name="" descr=""/>
-          <p:cNvPicPr/>
-          <p:nvPr/>
-        </p:nvPicPr>
-        <p:blipFill>
           <a:blip r:embed="rId3"/>
           <a:stretch/>
         </p:blipFill>
         <p:spPr>
           <a:xfrm>
-            <a:off x="5058360" y="3601800"/>
-            <a:ext cx="2073960" cy="1654920"/>
+            <a:off x="5058360" y="3602160"/>
+            <a:ext cx="2073600" cy="1654560"/>
           </a:xfrm>
           <a:prstGeom prst="rect">
             <a:avLst/>
@@ -2093,7 +2093,7 @@
       </p:grpSpPr>
       <p:sp>
         <p:nvSpPr>
-          <p:cNvPr id="5" name="PlaceHolder 1"/>
+          <p:cNvPr id="4" name="PlaceHolder 1"/>
           <p:cNvSpPr>
             <a:spLocks noGrp="1"/>
           </p:cNvSpPr>
@@ -2104,7 +2104,7 @@
         <p:spPr>
           <a:xfrm>
             <a:off x="1523880" y="1122480"/>
-            <a:ext cx="9143280" cy="2386800"/>
+            <a:ext cx="9142920" cy="2386440"/>
           </a:xfrm>
           <a:prstGeom prst="rect">
             <a:avLst/>
@@ -2120,7 +2120,7 @@
       </p:sp>
       <p:sp>
         <p:nvSpPr>
-          <p:cNvPr id="6" name="PlaceHolder 2"/>
+          <p:cNvPr id="5" name="PlaceHolder 2"/>
           <p:cNvSpPr>
             <a:spLocks noGrp="1"/>
           </p:cNvSpPr>
@@ -2131,7 +2131,7 @@
         <p:spPr>
           <a:xfrm>
             <a:off x="1523880" y="3602160"/>
-            <a:ext cx="9143280" cy="1654920"/>
+            <a:ext cx="9142920" cy="1654560"/>
           </a:xfrm>
           <a:prstGeom prst="rect">
             <a:avLst/>
@@ -2168,7 +2168,7 @@
       </p:grpSpPr>
       <p:sp>
         <p:nvSpPr>
-          <p:cNvPr id="7" name="PlaceHolder 1"/>
+          <p:cNvPr id="6" name="PlaceHolder 1"/>
           <p:cNvSpPr>
             <a:spLocks noGrp="1"/>
           </p:cNvSpPr>
@@ -2179,7 +2179,7 @@
         <p:spPr>
           <a:xfrm>
             <a:off x="1523880" y="1122480"/>
-            <a:ext cx="9143280" cy="2386800"/>
+            <a:ext cx="9142920" cy="2386440"/>
           </a:xfrm>
           <a:prstGeom prst="rect">
             <a:avLst/>
@@ -2195,7 +2195,7 @@
       </p:sp>
       <p:sp>
         <p:nvSpPr>
-          <p:cNvPr id="8" name="PlaceHolder 2"/>
+          <p:cNvPr id="7" name="PlaceHolder 2"/>
           <p:cNvSpPr>
             <a:spLocks noGrp="1"/>
           </p:cNvSpPr>
@@ -2206,7 +2206,7 @@
         <p:spPr>
           <a:xfrm>
             <a:off x="1523880" y="3602160"/>
-            <a:ext cx="4461840" cy="1654920"/>
+            <a:ext cx="4461480" cy="1654560"/>
           </a:xfrm>
           <a:prstGeom prst="rect">
             <a:avLst/>
@@ -2221,7 +2221,7 @@
       </p:sp>
       <p:sp>
         <p:nvSpPr>
-          <p:cNvPr id="9" name="PlaceHolder 3"/>
+          <p:cNvPr id="8" name="PlaceHolder 3"/>
           <p:cNvSpPr>
             <a:spLocks noGrp="1"/>
           </p:cNvSpPr>
@@ -2231,8 +2231,8 @@
         </p:nvSpPr>
         <p:spPr>
           <a:xfrm>
-            <a:off x="6209280" y="3602160"/>
-            <a:ext cx="4461840" cy="1654920"/>
+            <a:off x="6208920" y="3602160"/>
+            <a:ext cx="4461480" cy="1654560"/>
           </a:xfrm>
           <a:prstGeom prst="rect">
             <a:avLst/>
@@ -2269,7 +2269,7 @@
       </p:grpSpPr>
       <p:sp>
         <p:nvSpPr>
-          <p:cNvPr id="10" name="PlaceHolder 1"/>
+          <p:cNvPr id="9" name="PlaceHolder 1"/>
           <p:cNvSpPr>
             <a:spLocks noGrp="1"/>
           </p:cNvSpPr>
@@ -2280,7 +2280,7 @@
         <p:spPr>
           <a:xfrm>
             <a:off x="1523880" y="1122480"/>
-            <a:ext cx="9143280" cy="2386800"/>
+            <a:ext cx="9142920" cy="2386440"/>
           </a:xfrm>
           <a:prstGeom prst="rect">
             <a:avLst/>
@@ -2318,7 +2318,7 @@
       </p:grpSpPr>
       <p:sp>
         <p:nvSpPr>
-          <p:cNvPr id="11" name="PlaceHolder 1"/>
+          <p:cNvPr id="10" name="PlaceHolder 1"/>
           <p:cNvSpPr>
             <a:spLocks noGrp="1"/>
           </p:cNvSpPr>
@@ -2329,7 +2329,7 @@
         <p:spPr>
           <a:xfrm>
             <a:off x="1523880" y="1122480"/>
-            <a:ext cx="9143280" cy="11064960"/>
+            <a:ext cx="9142920" cy="11063520"/>
           </a:xfrm>
           <a:prstGeom prst="rect">
             <a:avLst/>
@@ -2367,7 +2367,7 @@
       </p:grpSpPr>
       <p:sp>
         <p:nvSpPr>
-          <p:cNvPr id="12" name="PlaceHolder 1"/>
+          <p:cNvPr id="11" name="PlaceHolder 1"/>
           <p:cNvSpPr>
             <a:spLocks noGrp="1"/>
           </p:cNvSpPr>
@@ -2378,7 +2378,7 @@
         <p:spPr>
           <a:xfrm>
             <a:off x="1523880" y="1122480"/>
-            <a:ext cx="9143280" cy="2386800"/>
+            <a:ext cx="9142920" cy="2386440"/>
           </a:xfrm>
           <a:prstGeom prst="rect">
             <a:avLst/>
@@ -2394,7 +2394,7 @@
       </p:sp>
       <p:sp>
         <p:nvSpPr>
-          <p:cNvPr id="13" name="PlaceHolder 2"/>
+          <p:cNvPr id="12" name="PlaceHolder 2"/>
           <p:cNvSpPr>
             <a:spLocks noGrp="1"/>
           </p:cNvSpPr>
@@ -2405,7 +2405,7 @@
         <p:spPr>
           <a:xfrm>
             <a:off x="1523880" y="3602160"/>
-            <a:ext cx="4461840" cy="789120"/>
+            <a:ext cx="4461480" cy="789120"/>
           </a:xfrm>
           <a:prstGeom prst="rect">
             <a:avLst/>
@@ -2420,7 +2420,7 @@
       </p:sp>
       <p:sp>
         <p:nvSpPr>
-          <p:cNvPr id="14" name="PlaceHolder 3"/>
+          <p:cNvPr id="13" name="PlaceHolder 3"/>
           <p:cNvSpPr>
             <a:spLocks noGrp="1"/>
           </p:cNvSpPr>
@@ -2431,7 +2431,7 @@
         <p:spPr>
           <a:xfrm>
             <a:off x="1523880" y="4466520"/>
-            <a:ext cx="4461840" cy="789120"/>
+            <a:ext cx="4461480" cy="789120"/>
           </a:xfrm>
           <a:prstGeom prst="rect">
             <a:avLst/>
@@ -2446,7 +2446,7 @@
       </p:sp>
       <p:sp>
         <p:nvSpPr>
-          <p:cNvPr id="15" name="PlaceHolder 4"/>
+          <p:cNvPr id="14" name="PlaceHolder 4"/>
           <p:cNvSpPr>
             <a:spLocks noGrp="1"/>
           </p:cNvSpPr>
@@ -2456,8 +2456,8 @@
         </p:nvSpPr>
         <p:spPr>
           <a:xfrm>
-            <a:off x="6209280" y="3602160"/>
-            <a:ext cx="4461840" cy="1654920"/>
+            <a:off x="6208920" y="3602160"/>
+            <a:ext cx="4461480" cy="1654560"/>
           </a:xfrm>
           <a:prstGeom prst="rect">
             <a:avLst/>
@@ -2494,7 +2494,7 @@
       </p:grpSpPr>
       <p:sp>
         <p:nvSpPr>
-          <p:cNvPr id="16" name="PlaceHolder 1"/>
+          <p:cNvPr id="15" name="PlaceHolder 1"/>
           <p:cNvSpPr>
             <a:spLocks noGrp="1"/>
           </p:cNvSpPr>
@@ -2505,7 +2505,7 @@
         <p:spPr>
           <a:xfrm>
             <a:off x="1523880" y="1122480"/>
-            <a:ext cx="9143280" cy="2386800"/>
+            <a:ext cx="9142920" cy="2386440"/>
           </a:xfrm>
           <a:prstGeom prst="rect">
             <a:avLst/>
@@ -2521,7 +2521,7 @@
       </p:sp>
       <p:sp>
         <p:nvSpPr>
-          <p:cNvPr id="17" name="PlaceHolder 2"/>
+          <p:cNvPr id="16" name="PlaceHolder 2"/>
           <p:cNvSpPr>
             <a:spLocks noGrp="1"/>
           </p:cNvSpPr>
@@ -2532,7 +2532,7 @@
         <p:spPr>
           <a:xfrm>
             <a:off x="1523880" y="3602160"/>
-            <a:ext cx="4461840" cy="1654920"/>
+            <a:ext cx="4461480" cy="1654560"/>
           </a:xfrm>
           <a:prstGeom prst="rect">
             <a:avLst/>
@@ -2547,7 +2547,7 @@
       </p:sp>
       <p:sp>
         <p:nvSpPr>
-          <p:cNvPr id="18" name="PlaceHolder 3"/>
+          <p:cNvPr id="17" name="PlaceHolder 3"/>
           <p:cNvSpPr>
             <a:spLocks noGrp="1"/>
           </p:cNvSpPr>
@@ -2557,8 +2557,8 @@
         </p:nvSpPr>
         <p:spPr>
           <a:xfrm>
-            <a:off x="6209280" y="3602160"/>
-            <a:ext cx="4461840" cy="789120"/>
+            <a:off x="6208920" y="3602160"/>
+            <a:ext cx="4461480" cy="789120"/>
           </a:xfrm>
           <a:prstGeom prst="rect">
             <a:avLst/>
@@ -2573,7 +2573,7 @@
       </p:sp>
       <p:sp>
         <p:nvSpPr>
-          <p:cNvPr id="19" name="PlaceHolder 4"/>
+          <p:cNvPr id="18" name="PlaceHolder 4"/>
           <p:cNvSpPr>
             <a:spLocks noGrp="1"/>
           </p:cNvSpPr>
@@ -2583,8 +2583,8 @@
         </p:nvSpPr>
         <p:spPr>
           <a:xfrm>
-            <a:off x="6209280" y="4466520"/>
-            <a:ext cx="4461840" cy="789120"/>
+            <a:off x="6208920" y="4466520"/>
+            <a:ext cx="4461480" cy="789120"/>
           </a:xfrm>
           <a:prstGeom prst="rect">
             <a:avLst/>
@@ -2621,7 +2621,7 @@
       </p:grpSpPr>
       <p:sp>
         <p:nvSpPr>
-          <p:cNvPr id="20" name="PlaceHolder 1"/>
+          <p:cNvPr id="19" name="PlaceHolder 1"/>
           <p:cNvSpPr>
             <a:spLocks noGrp="1"/>
           </p:cNvSpPr>
@@ -2632,7 +2632,7 @@
         <p:spPr>
           <a:xfrm>
             <a:off x="1523880" y="1122480"/>
-            <a:ext cx="9143280" cy="2386800"/>
+            <a:ext cx="9142920" cy="2386440"/>
           </a:xfrm>
           <a:prstGeom prst="rect">
             <a:avLst/>
@@ -2648,7 +2648,7 @@
       </p:sp>
       <p:sp>
         <p:nvSpPr>
-          <p:cNvPr id="21" name="PlaceHolder 2"/>
+          <p:cNvPr id="20" name="PlaceHolder 2"/>
           <p:cNvSpPr>
             <a:spLocks noGrp="1"/>
           </p:cNvSpPr>
@@ -2659,7 +2659,7 @@
         <p:spPr>
           <a:xfrm>
             <a:off x="1523880" y="3602160"/>
-            <a:ext cx="4461840" cy="789120"/>
+            <a:ext cx="4461480" cy="789120"/>
           </a:xfrm>
           <a:prstGeom prst="rect">
             <a:avLst/>
@@ -2674,7 +2674,7 @@
       </p:sp>
       <p:sp>
         <p:nvSpPr>
-          <p:cNvPr id="22" name="PlaceHolder 3"/>
+          <p:cNvPr id="21" name="PlaceHolder 3"/>
           <p:cNvSpPr>
             <a:spLocks noGrp="1"/>
           </p:cNvSpPr>
@@ -2684,8 +2684,8 @@
         </p:nvSpPr>
         <p:spPr>
           <a:xfrm>
-            <a:off x="6209280" y="3602160"/>
-            <a:ext cx="4461840" cy="789120"/>
+            <a:off x="6208920" y="3602160"/>
+            <a:ext cx="4461480" cy="789120"/>
           </a:xfrm>
           <a:prstGeom prst="rect">
             <a:avLst/>
@@ -2700,7 +2700,7 @@
       </p:sp>
       <p:sp>
         <p:nvSpPr>
-          <p:cNvPr id="23" name="PlaceHolder 4"/>
+          <p:cNvPr id="22" name="PlaceHolder 4"/>
           <p:cNvSpPr>
             <a:spLocks noGrp="1"/>
           </p:cNvSpPr>
@@ -2711,7 +2711,7 @@
         <p:spPr>
           <a:xfrm>
             <a:off x="1523880" y="4466520"/>
-            <a:ext cx="9143280" cy="789120"/>
+            <a:ext cx="9142920" cy="789120"/>
           </a:xfrm>
           <a:prstGeom prst="rect">
             <a:avLst/>
@@ -2766,7 +2766,7 @@
         <p:spPr>
           <a:xfrm>
             <a:off x="1523880" y="1122480"/>
-            <a:ext cx="9143280" cy="2386800"/>
+            <a:ext cx="9142920" cy="2386440"/>
           </a:xfrm>
           <a:prstGeom prst="rect">
             <a:avLst/>
@@ -2787,40 +2787,13 @@
             <a:spLocks noGrp="1"/>
           </p:cNvSpPr>
           <p:nvPr>
-            <p:ph type="subTitle"/>
-          </p:nvPr>
-        </p:nvSpPr>
-        <p:spPr>
-          <a:xfrm>
-            <a:off x="1523880" y="3602160"/>
-            <a:ext cx="9143280" cy="1654920"/>
-          </a:xfrm>
-          <a:prstGeom prst="rect">
-            <a:avLst/>
-          </a:prstGeom>
-        </p:spPr>
-        <p:txBody>
-          <a:bodyPr lIns="0" rIns="0" tIns="0" bIns="0" anchor="ctr"/>
-          <a:p>
-            <a:pPr algn="ctr"/>
-            <a:endParaRPr/>
-          </a:p>
-        </p:txBody>
-      </p:sp>
-      <p:sp>
-        <p:nvSpPr>
-          <p:cNvPr id="2" name="PlaceHolder 3"/>
-          <p:cNvSpPr>
-            <a:spLocks noGrp="1"/>
-          </p:cNvSpPr>
-          <p:nvPr>
             <p:ph type="body"/>
           </p:nvPr>
         </p:nvSpPr>
         <p:spPr>
           <a:xfrm>
-            <a:off x="609480" y="1604520"/>
-            <a:ext cx="10972440" cy="3977280"/>
+            <a:off x="1523880" y="3602160"/>
+            <a:ext cx="9142920" cy="1654560"/>
           </a:xfrm>
           <a:prstGeom prst="rect">
             <a:avLst/>
@@ -2838,7 +2811,7 @@
               <a:buChar char=""/>
             </a:pPr>
             <a:r>
-              <a:rPr lang="en-GB" sz="3200" spc="-1">
+              <a:rPr lang="en-GB" sz="1800" spc="-1">
                 <a:latin typeface="Arial"/>
               </a:rPr>
               <a:t>Click to edit the outline text format</a:t>
@@ -2855,7 +2828,7 @@
               <a:buChar char=""/>
             </a:pPr>
             <a:r>
-              <a:rPr lang="en-GB" sz="2800" spc="-1">
+              <a:rPr lang="en-GB" sz="1800" spc="-1">
                 <a:latin typeface="Arial"/>
               </a:rPr>
               <a:t>Second Outline Level</a:t>
@@ -2872,7 +2845,7 @@
               <a:buChar char=""/>
             </a:pPr>
             <a:r>
-              <a:rPr lang="en-GB" sz="2400" spc="-1">
+              <a:rPr lang="en-GB" sz="1800" spc="-1">
                 <a:latin typeface="Arial"/>
               </a:rPr>
               <a:t>Third Outline Level</a:t>
@@ -2889,7 +2862,7 @@
               <a:buChar char=""/>
             </a:pPr>
             <a:r>
-              <a:rPr lang="en-GB" sz="2000" spc="-1">
+              <a:rPr lang="en-GB" sz="1800" spc="-1">
                 <a:latin typeface="Arial"/>
               </a:rPr>
               <a:t>Fourth Outline Level</a:t>
@@ -2906,7 +2879,7 @@
               <a:buChar char=""/>
             </a:pPr>
             <a:r>
-              <a:rPr lang="en-GB" sz="2000" spc="-1">
+              <a:rPr lang="en-GB" sz="1800" spc="-1">
                 <a:latin typeface="Arial"/>
               </a:rPr>
               <a:t>Fifth Outline Level</a:t>
@@ -2923,7 +2896,7 @@
               <a:buChar char=""/>
             </a:pPr>
             <a:r>
-              <a:rPr lang="en-GB" sz="2000" spc="-1">
+              <a:rPr lang="en-GB" sz="1800" spc="-1">
                 <a:latin typeface="Arial"/>
               </a:rPr>
               <a:t>Sixth Outline Level</a:t>
@@ -2940,7 +2913,7 @@
               <a:buChar char=""/>
             </a:pPr>
             <a:r>
-              <a:rPr lang="en-GB" sz="2000" spc="-1">
+              <a:rPr lang="en-GB" sz="1800" spc="-1">
                 <a:latin typeface="Arial"/>
               </a:rPr>
               <a:t>Seventh Outline Level</a:t>
@@ -2995,7 +2968,7 @@
       </p:grpSpPr>
       <p:sp>
         <p:nvSpPr>
-          <p:cNvPr id="37" name="PlaceHolder 1"/>
+          <p:cNvPr id="36" name="PlaceHolder 1"/>
           <p:cNvSpPr>
             <a:spLocks noGrp="1"/>
           </p:cNvSpPr>
@@ -3028,7 +3001,7 @@
       </p:sp>
       <p:sp>
         <p:nvSpPr>
-          <p:cNvPr id="38" name="PlaceHolder 2"/>
+          <p:cNvPr id="37" name="PlaceHolder 2"/>
           <p:cNvSpPr>
             <a:spLocks noGrp="1"/>
           </p:cNvSpPr>
@@ -3207,14 +3180,14 @@
       </p:grpSpPr>
       <p:sp>
         <p:nvSpPr>
-          <p:cNvPr id="78" name="CustomShape 1"/>
+          <p:cNvPr id="77" name="CustomShape 1"/>
           <p:cNvSpPr/>
           <p:nvPr/>
         </p:nvSpPr>
         <p:spPr>
           <a:xfrm>
             <a:off x="1523880" y="1122480"/>
-            <a:ext cx="9143280" cy="2386800"/>
+            <a:ext cx="9142920" cy="2386440"/>
           </a:xfrm>
           <a:prstGeom prst="rect">
             <a:avLst/>
@@ -3259,14 +3232,14 @@
       </p:sp>
       <p:sp>
         <p:nvSpPr>
-          <p:cNvPr id="79" name="CustomShape 2"/>
+          <p:cNvPr id="78" name="CustomShape 2"/>
           <p:cNvSpPr/>
           <p:nvPr/>
         </p:nvSpPr>
         <p:spPr>
           <a:xfrm>
             <a:off x="1523880" y="3602160"/>
-            <a:ext cx="9143280" cy="1654920"/>
+            <a:ext cx="9142920" cy="1654560"/>
           </a:xfrm>
           <a:prstGeom prst="rect">
             <a:avLst/>
@@ -3383,14 +3356,14 @@
       </p:grpSpPr>
       <p:sp>
         <p:nvSpPr>
-          <p:cNvPr id="135" name="CustomShape 1"/>
+          <p:cNvPr id="134" name="CustomShape 1"/>
           <p:cNvSpPr/>
           <p:nvPr/>
         </p:nvSpPr>
         <p:spPr>
           <a:xfrm>
             <a:off x="838080" y="365040"/>
-            <a:ext cx="10514880" cy="1324800"/>
+            <a:ext cx="10514520" cy="1324440"/>
           </a:xfrm>
           <a:prstGeom prst="rect">
             <a:avLst/>
@@ -3435,14 +3408,14 @@
       </p:sp>
       <p:sp>
         <p:nvSpPr>
-          <p:cNvPr id="136" name="CustomShape 2"/>
+          <p:cNvPr id="135" name="CustomShape 2"/>
           <p:cNvSpPr/>
           <p:nvPr/>
         </p:nvSpPr>
         <p:spPr>
           <a:xfrm>
             <a:off x="838080" y="1825560"/>
-            <a:ext cx="10514880" cy="4350600"/>
+            <a:ext cx="10514520" cy="4350240"/>
           </a:xfrm>
           <a:prstGeom prst="rect">
             <a:avLst/>
@@ -3461,7 +3434,7 @@
         <p:txBody>
           <a:bodyPr lIns="90000" rIns="90000" tIns="45000" bIns="45000"/>
           <a:p>
-            <a:pPr marL="228600" indent="-227880">
+            <a:pPr marL="228600" indent="-227520">
               <a:lnSpc>
                 <a:spcPct val="90000"/>
               </a:lnSpc>
@@ -3486,7 +3459,7 @@
             <a:endParaRPr/>
           </a:p>
           <a:p>
-            <a:pPr marL="228600" indent="-227880">
+            <a:pPr marL="228600" indent="-227520">
               <a:lnSpc>
                 <a:spcPct val="90000"/>
               </a:lnSpc>
@@ -3526,7 +3499,7 @@
             <a:endParaRPr/>
           </a:p>
           <a:p>
-            <a:pPr marL="228600" indent="-227880">
+            <a:pPr marL="228600" indent="-227520">
               <a:lnSpc>
                 <a:spcPct val="90000"/>
               </a:lnSpc>
@@ -3551,7 +3524,7 @@
             <a:endParaRPr/>
           </a:p>
           <a:p>
-            <a:pPr marL="228600" indent="-227880">
+            <a:pPr marL="228600" indent="-227520">
               <a:lnSpc>
                 <a:spcPct val="90000"/>
               </a:lnSpc>
@@ -3576,7 +3549,7 @@
             <a:endParaRPr/>
           </a:p>
           <a:p>
-            <a:pPr marL="228600" indent="-227880">
+            <a:pPr marL="228600" indent="-227520">
               <a:lnSpc>
                 <a:spcPct val="90000"/>
               </a:lnSpc>
@@ -3604,14 +3577,14 @@
       </p:sp>
       <p:sp>
         <p:nvSpPr>
-          <p:cNvPr id="137" name="CustomShape 3"/>
+          <p:cNvPr id="136" name="CustomShape 3"/>
           <p:cNvSpPr/>
           <p:nvPr/>
         </p:nvSpPr>
         <p:spPr>
           <a:xfrm>
             <a:off x="2722320" y="4826520"/>
-            <a:ext cx="6454440" cy="1753560"/>
+            <a:ext cx="6454080" cy="1753200"/>
           </a:xfrm>
           <a:prstGeom prst="rect">
             <a:avLst/>
@@ -3792,14 +3765,14 @@
       </p:grpSpPr>
       <p:sp>
         <p:nvSpPr>
-          <p:cNvPr id="138" name="CustomShape 1"/>
+          <p:cNvPr id="137" name="CustomShape 1"/>
           <p:cNvSpPr/>
           <p:nvPr/>
         </p:nvSpPr>
         <p:spPr>
           <a:xfrm>
             <a:off x="838080" y="365040"/>
-            <a:ext cx="10514880" cy="1324800"/>
+            <a:ext cx="10514520" cy="1324440"/>
           </a:xfrm>
           <a:prstGeom prst="rect">
             <a:avLst/>
@@ -3844,14 +3817,14 @@
       </p:sp>
       <p:sp>
         <p:nvSpPr>
-          <p:cNvPr id="139" name="CustomShape 2"/>
+          <p:cNvPr id="138" name="CustomShape 2"/>
           <p:cNvSpPr/>
           <p:nvPr/>
         </p:nvSpPr>
         <p:spPr>
           <a:xfrm>
             <a:off x="838080" y="1825560"/>
-            <a:ext cx="10514880" cy="4350600"/>
+            <a:ext cx="10514520" cy="4350240"/>
           </a:xfrm>
           <a:prstGeom prst="rect">
             <a:avLst/>
@@ -3870,7 +3843,7 @@
         <p:txBody>
           <a:bodyPr lIns="90000" rIns="90000" tIns="45000" bIns="45000"/>
           <a:p>
-            <a:pPr marL="228600" indent="-227880">
+            <a:pPr marL="228600" indent="-227520">
               <a:lnSpc>
                 <a:spcPct val="90000"/>
               </a:lnSpc>
@@ -3895,7 +3868,7 @@
             <a:endParaRPr/>
           </a:p>
           <a:p>
-            <a:pPr lvl="1" marL="685800" indent="-227880">
+            <a:pPr lvl="1" marL="685800" indent="-227520">
               <a:lnSpc>
                 <a:spcPct val="90000"/>
               </a:lnSpc>
@@ -3980,7 +3953,7 @@
             <a:endParaRPr/>
           </a:p>
           <a:p>
-            <a:pPr lvl="1" marL="685800" indent="-227880">
+            <a:pPr lvl="1" marL="685800" indent="-227520">
               <a:lnSpc>
                 <a:spcPct val="90000"/>
               </a:lnSpc>
@@ -4005,7 +3978,7 @@
             <a:endParaRPr/>
           </a:p>
           <a:p>
-            <a:pPr lvl="1" marL="685800" indent="-227880">
+            <a:pPr lvl="1" marL="685800" indent="-227520">
               <a:lnSpc>
                 <a:spcPct val="90000"/>
               </a:lnSpc>
@@ -4030,7 +4003,7 @@
             <a:endParaRPr/>
           </a:p>
           <a:p>
-            <a:pPr lvl="1" marL="685800" indent="-227880">
+            <a:pPr lvl="1" marL="685800" indent="-227520">
               <a:lnSpc>
                 <a:spcPct val="90000"/>
               </a:lnSpc>
@@ -4055,7 +4028,7 @@
             <a:endParaRPr/>
           </a:p>
           <a:p>
-            <a:pPr marL="228600" indent="-227880">
+            <a:pPr marL="228600" indent="-227520">
               <a:lnSpc>
                 <a:spcPct val="90000"/>
               </a:lnSpc>
@@ -4080,7 +4053,7 @@
             <a:endParaRPr/>
           </a:p>
           <a:p>
-            <a:pPr marL="228600" indent="-227880">
+            <a:pPr marL="228600" indent="-227520">
               <a:lnSpc>
                 <a:spcPct val="90000"/>
               </a:lnSpc>
@@ -4105,7 +4078,7 @@
             <a:endParaRPr/>
           </a:p>
           <a:p>
-            <a:pPr marL="228600" indent="-227880">
+            <a:pPr marL="228600" indent="-227520">
               <a:lnSpc>
                 <a:spcPct val="90000"/>
               </a:lnSpc>
@@ -4130,7 +4103,7 @@
             <a:endParaRPr/>
           </a:p>
           <a:p>
-            <a:pPr marL="228600" indent="-227880">
+            <a:pPr marL="228600" indent="-227520">
               <a:lnSpc>
                 <a:spcPct val="100000"/>
               </a:lnSpc>
@@ -4218,14 +4191,14 @@
       </p:grpSpPr>
       <p:sp>
         <p:nvSpPr>
-          <p:cNvPr id="140" name="CustomShape 1"/>
+          <p:cNvPr id="139" name="CustomShape 1"/>
           <p:cNvSpPr/>
           <p:nvPr/>
         </p:nvSpPr>
         <p:spPr>
           <a:xfrm>
             <a:off x="838080" y="1825560"/>
-            <a:ext cx="10514880" cy="4350600"/>
+            <a:ext cx="10514520" cy="4350240"/>
           </a:xfrm>
           <a:prstGeom prst="rect">
             <a:avLst/>
@@ -4244,14 +4217,14 @@
       </p:sp>
       <p:sp>
         <p:nvSpPr>
-          <p:cNvPr id="141" name="CustomShape 2"/>
+          <p:cNvPr id="140" name="CustomShape 2"/>
           <p:cNvSpPr/>
           <p:nvPr/>
         </p:nvSpPr>
         <p:spPr>
           <a:xfrm>
             <a:off x="838080" y="365040"/>
-            <a:ext cx="10514880" cy="1324800"/>
+            <a:ext cx="10514520" cy="1324440"/>
           </a:xfrm>
           <a:prstGeom prst="rect">
             <a:avLst/>
@@ -4270,7 +4243,7 @@
       </p:sp>
       <p:pic>
         <p:nvPicPr>
-          <p:cNvPr id="142" name="Picture 3" descr=""/>
+          <p:cNvPr id="141" name="Picture 3" descr=""/>
           <p:cNvPicPr/>
           <p:nvPr/>
         </p:nvPicPr>
@@ -4281,7 +4254,7 @@
         <p:spPr>
           <a:xfrm>
             <a:off x="2184480" y="368280"/>
-            <a:ext cx="7817400" cy="6116760"/>
+            <a:ext cx="7817040" cy="6116400"/>
           </a:xfrm>
           <a:prstGeom prst="rect">
             <a:avLst/>
@@ -4342,14 +4315,14 @@
       </p:grpSpPr>
       <p:sp>
         <p:nvSpPr>
-          <p:cNvPr id="143" name="CustomShape 1"/>
+          <p:cNvPr id="142" name="CustomShape 1"/>
           <p:cNvSpPr/>
           <p:nvPr/>
         </p:nvSpPr>
         <p:spPr>
           <a:xfrm>
             <a:off x="838080" y="365040"/>
-            <a:ext cx="10514880" cy="1324800"/>
+            <a:ext cx="10514520" cy="1324440"/>
           </a:xfrm>
           <a:prstGeom prst="rect">
             <a:avLst/>
@@ -4368,14 +4341,14 @@
       </p:sp>
       <p:sp>
         <p:nvSpPr>
-          <p:cNvPr id="144" name="CustomShape 2"/>
+          <p:cNvPr id="143" name="CustomShape 2"/>
           <p:cNvSpPr/>
           <p:nvPr/>
         </p:nvSpPr>
         <p:spPr>
           <a:xfrm>
             <a:off x="838080" y="1825560"/>
-            <a:ext cx="10514880" cy="4350600"/>
+            <a:ext cx="10514520" cy="4350240"/>
           </a:xfrm>
           <a:prstGeom prst="rect">
             <a:avLst/>
@@ -4394,7 +4367,7 @@
       </p:sp>
       <p:pic>
         <p:nvPicPr>
-          <p:cNvPr id="145" name="Picture 3" descr=""/>
+          <p:cNvPr id="144" name="Picture 3" descr=""/>
           <p:cNvPicPr/>
           <p:nvPr/>
         </p:nvPicPr>
@@ -4405,7 +4378,7 @@
         <p:spPr>
           <a:xfrm>
             <a:off x="2184480" y="368280"/>
-            <a:ext cx="7817400" cy="6116760"/>
+            <a:ext cx="7817040" cy="6116400"/>
           </a:xfrm>
           <a:prstGeom prst="rect">
             <a:avLst/>
@@ -4466,14 +4439,14 @@
       </p:grpSpPr>
       <p:sp>
         <p:nvSpPr>
-          <p:cNvPr id="146" name="CustomShape 1"/>
+          <p:cNvPr id="145" name="CustomShape 1"/>
           <p:cNvSpPr/>
           <p:nvPr/>
         </p:nvSpPr>
         <p:spPr>
           <a:xfrm>
             <a:off x="838080" y="365040"/>
-            <a:ext cx="10514880" cy="1324800"/>
+            <a:ext cx="10514520" cy="1324440"/>
           </a:xfrm>
           <a:prstGeom prst="rect">
             <a:avLst/>
@@ -4492,14 +4465,14 @@
       </p:sp>
       <p:sp>
         <p:nvSpPr>
-          <p:cNvPr id="147" name="CustomShape 2"/>
+          <p:cNvPr id="146" name="CustomShape 2"/>
           <p:cNvSpPr/>
           <p:nvPr/>
         </p:nvSpPr>
         <p:spPr>
           <a:xfrm>
             <a:off x="838080" y="1825560"/>
-            <a:ext cx="10514880" cy="4350600"/>
+            <a:ext cx="10514520" cy="4350240"/>
           </a:xfrm>
           <a:prstGeom prst="rect">
             <a:avLst/>
@@ -4518,7 +4491,7 @@
       </p:sp>
       <p:pic>
         <p:nvPicPr>
-          <p:cNvPr id="148" name="Picture 3" descr=""/>
+          <p:cNvPr id="147" name="Picture 3" descr=""/>
           <p:cNvPicPr/>
           <p:nvPr/>
         </p:nvPicPr>
@@ -4529,7 +4502,7 @@
         <p:spPr>
           <a:xfrm>
             <a:off x="2184480" y="368280"/>
-            <a:ext cx="7817400" cy="6116760"/>
+            <a:ext cx="7817040" cy="6116400"/>
           </a:xfrm>
           <a:prstGeom prst="rect">
             <a:avLst/>
@@ -4590,14 +4563,14 @@
       </p:grpSpPr>
       <p:sp>
         <p:nvSpPr>
-          <p:cNvPr id="149" name="CustomShape 1"/>
+          <p:cNvPr id="148" name="CustomShape 1"/>
           <p:cNvSpPr/>
           <p:nvPr/>
         </p:nvSpPr>
         <p:spPr>
           <a:xfrm>
             <a:off x="838080" y="1825560"/>
-            <a:ext cx="10514880" cy="4350600"/>
+            <a:ext cx="10514520" cy="4350240"/>
           </a:xfrm>
           <a:prstGeom prst="rect">
             <a:avLst/>
@@ -4616,7 +4589,7 @@
       </p:sp>
       <p:pic>
         <p:nvPicPr>
-          <p:cNvPr id="150" name="Picture 1" descr=""/>
+          <p:cNvPr id="149" name="Picture 1" descr=""/>
           <p:cNvPicPr/>
           <p:nvPr/>
         </p:nvPicPr>
@@ -4627,7 +4600,7 @@
         <p:spPr>
           <a:xfrm>
             <a:off x="1869480" y="365040"/>
-            <a:ext cx="8134920" cy="6365160"/>
+            <a:ext cx="8134560" cy="6364800"/>
           </a:xfrm>
           <a:prstGeom prst="rect">
             <a:avLst/>
@@ -4639,14 +4612,14 @@
       </p:pic>
       <p:sp>
         <p:nvSpPr>
-          <p:cNvPr id="151" name="CustomShape 2"/>
+          <p:cNvPr id="150" name="CustomShape 2"/>
           <p:cNvSpPr/>
           <p:nvPr/>
         </p:nvSpPr>
         <p:spPr>
           <a:xfrm>
             <a:off x="838080" y="365040"/>
-            <a:ext cx="10514880" cy="1324800"/>
+            <a:ext cx="10514520" cy="1324440"/>
           </a:xfrm>
           <a:prstGeom prst="rect">
             <a:avLst/>
@@ -4714,14 +4687,14 @@
       </p:grpSpPr>
       <p:sp>
         <p:nvSpPr>
-          <p:cNvPr id="152" name="CustomShape 1"/>
+          <p:cNvPr id="151" name="CustomShape 1"/>
           <p:cNvSpPr/>
           <p:nvPr/>
         </p:nvSpPr>
         <p:spPr>
           <a:xfrm>
             <a:off x="838080" y="365040"/>
-            <a:ext cx="10514880" cy="1324800"/>
+            <a:ext cx="10514520" cy="1324440"/>
           </a:xfrm>
           <a:prstGeom prst="rect">
             <a:avLst/>
@@ -4766,7 +4739,7 @@
       </p:sp>
       <p:pic>
         <p:nvPicPr>
-          <p:cNvPr id="153" name="Picture 2" descr=""/>
+          <p:cNvPr id="152" name="Picture 2" descr=""/>
           <p:cNvPicPr/>
           <p:nvPr/>
         </p:nvPicPr>
@@ -4777,7 +4750,7 @@
         <p:spPr>
           <a:xfrm>
             <a:off x="1066680" y="1690560"/>
-            <a:ext cx="10057680" cy="5117400"/>
+            <a:ext cx="10057320" cy="5117040"/>
           </a:xfrm>
           <a:prstGeom prst="rect">
             <a:avLst/>
@@ -4838,7 +4811,7 @@
       </p:grpSpPr>
       <p:pic>
         <p:nvPicPr>
-          <p:cNvPr id="154" name="" descr=""/>
+          <p:cNvPr id="153" name="" descr=""/>
           <p:cNvPicPr/>
           <p:nvPr/>
         </p:nvPicPr>
@@ -4849,7 +4822,7 @@
         <p:spPr>
           <a:xfrm>
             <a:off x="6372000" y="4053600"/>
-            <a:ext cx="4129200" cy="2750400"/>
+            <a:ext cx="4128840" cy="2750040"/>
           </a:xfrm>
           <a:prstGeom prst="rect">
             <a:avLst/>
@@ -4861,7 +4834,7 @@
       </p:pic>
       <p:pic>
         <p:nvPicPr>
-          <p:cNvPr id="155" name="" descr=""/>
+          <p:cNvPr id="154" name="" descr=""/>
           <p:cNvPicPr/>
           <p:nvPr/>
         </p:nvPicPr>
@@ -4872,7 +4845,7 @@
         <p:spPr>
           <a:xfrm>
             <a:off x="1341360" y="4115880"/>
-            <a:ext cx="4130640" cy="2753640"/>
+            <a:ext cx="4130280" cy="2753280"/>
           </a:xfrm>
           <a:prstGeom prst="rect">
             <a:avLst/>
@@ -4884,14 +4857,14 @@
       </p:pic>
       <p:sp>
         <p:nvSpPr>
-          <p:cNvPr id="156" name="CustomShape 1"/>
+          <p:cNvPr id="155" name="CustomShape 1"/>
           <p:cNvSpPr/>
           <p:nvPr/>
         </p:nvSpPr>
         <p:spPr>
           <a:xfrm>
             <a:off x="838080" y="365040"/>
-            <a:ext cx="10514880" cy="1324800"/>
+            <a:ext cx="10514520" cy="1324440"/>
           </a:xfrm>
           <a:prstGeom prst="rect">
             <a:avLst/>
@@ -4936,14 +4909,14 @@
       </p:sp>
       <p:sp>
         <p:nvSpPr>
-          <p:cNvPr id="157" name="CustomShape 2"/>
+          <p:cNvPr id="156" name="CustomShape 2"/>
           <p:cNvSpPr/>
           <p:nvPr/>
         </p:nvSpPr>
         <p:spPr>
           <a:xfrm>
             <a:off x="838080" y="1825560"/>
-            <a:ext cx="10514880" cy="4350600"/>
+            <a:ext cx="10514520" cy="4350240"/>
           </a:xfrm>
           <a:prstGeom prst="rect">
             <a:avLst/>
@@ -4962,7 +4935,7 @@
         <p:txBody>
           <a:bodyPr lIns="90000" rIns="90000" tIns="45000" bIns="45000"/>
           <a:p>
-            <a:pPr marL="285840" indent="-285120">
+            <a:pPr marL="285840" indent="-284760">
               <a:lnSpc>
                 <a:spcPct val="90000"/>
               </a:lnSpc>
@@ -4987,7 +4960,7 @@
             <a:endParaRPr/>
           </a:p>
           <a:p>
-            <a:pPr lvl="1" marL="743040" indent="-285120">
+            <a:pPr lvl="1" marL="743040" indent="-284760">
               <a:lnSpc>
                 <a:spcPct val="90000"/>
               </a:lnSpc>
@@ -5012,7 +4985,7 @@
             <a:endParaRPr/>
           </a:p>
           <a:p>
-            <a:pPr lvl="1" marL="743040" indent="-285120">
+            <a:pPr lvl="1" marL="743040" indent="-284760">
               <a:lnSpc>
                 <a:spcPct val="90000"/>
               </a:lnSpc>
@@ -5041,7 +5014,7 @@
       </p:sp>
       <p:pic>
         <p:nvPicPr>
-          <p:cNvPr id="158" name="Picture 1" descr=""/>
+          <p:cNvPr id="157" name="Picture 1" descr=""/>
           <p:cNvPicPr/>
           <p:nvPr/>
         </p:nvPicPr>
@@ -5052,7 +5025,7 @@
         <p:spPr>
           <a:xfrm>
             <a:off x="1562400" y="3492000"/>
-            <a:ext cx="3837600" cy="1212840"/>
+            <a:ext cx="3837240" cy="1212480"/>
           </a:xfrm>
           <a:prstGeom prst="rect">
             <a:avLst/>
@@ -5064,7 +5037,7 @@
       </p:pic>
       <p:pic>
         <p:nvPicPr>
-          <p:cNvPr id="159" name="Picture 3" descr=""/>
+          <p:cNvPr id="158" name="Picture 3" descr=""/>
           <p:cNvPicPr/>
           <p:nvPr/>
         </p:nvPicPr>
@@ -5075,7 +5048,7 @@
         <p:spPr>
           <a:xfrm>
             <a:off x="6494400" y="3528000"/>
-            <a:ext cx="3837600" cy="1202400"/>
+            <a:ext cx="3837240" cy="1202040"/>
           </a:xfrm>
           <a:prstGeom prst="rect">
             <a:avLst/>
@@ -5136,7 +5109,7 @@
       </p:grpSpPr>
       <p:pic>
         <p:nvPicPr>
-          <p:cNvPr id="160" name="" descr=""/>
+          <p:cNvPr id="159" name="" descr=""/>
           <p:cNvPicPr/>
           <p:nvPr/>
         </p:nvPicPr>
@@ -5147,7 +5120,7 @@
         <p:spPr>
           <a:xfrm>
             <a:off x="9378000" y="4129920"/>
-            <a:ext cx="2645640" cy="2645280"/>
+            <a:ext cx="2645280" cy="2644920"/>
           </a:xfrm>
           <a:prstGeom prst="rect">
             <a:avLst/>
@@ -5159,7 +5132,7 @@
       </p:pic>
       <p:pic>
         <p:nvPicPr>
-          <p:cNvPr id="161" name="" descr=""/>
+          <p:cNvPr id="160" name="" descr=""/>
           <p:cNvPicPr/>
           <p:nvPr/>
         </p:nvPicPr>
@@ -5170,7 +5143,7 @@
         <p:spPr>
           <a:xfrm>
             <a:off x="9378000" y="1512720"/>
-            <a:ext cx="2645640" cy="2645280"/>
+            <a:ext cx="2645280" cy="2644920"/>
           </a:xfrm>
           <a:prstGeom prst="rect">
             <a:avLst/>
@@ -5182,7 +5155,7 @@
       </p:pic>
       <p:pic>
         <p:nvPicPr>
-          <p:cNvPr id="162" name="Picture 11" descr=""/>
+          <p:cNvPr id="161" name="Picture 11" descr=""/>
           <p:cNvPicPr/>
           <p:nvPr/>
         </p:nvPicPr>
@@ -5193,7 +5166,7 @@
         <p:spPr>
           <a:xfrm>
             <a:off x="6918840" y="4156920"/>
-            <a:ext cx="2421720" cy="2421360"/>
+            <a:ext cx="2421360" cy="2421000"/>
           </a:xfrm>
           <a:prstGeom prst="rect">
             <a:avLst/>
@@ -5205,7 +5178,7 @@
       </p:pic>
       <p:pic>
         <p:nvPicPr>
-          <p:cNvPr id="163" name="Picture 10" descr=""/>
+          <p:cNvPr id="162" name="Picture 10" descr=""/>
           <p:cNvPicPr/>
           <p:nvPr/>
         </p:nvPicPr>
@@ -5216,7 +5189,7 @@
         <p:spPr>
           <a:xfrm>
             <a:off x="6919560" y="1497600"/>
-            <a:ext cx="2644200" cy="2643840"/>
+            <a:ext cx="2643840" cy="2643480"/>
           </a:xfrm>
           <a:prstGeom prst="rect">
             <a:avLst/>
@@ -5228,7 +5201,7 @@
       </p:pic>
       <p:pic>
         <p:nvPicPr>
-          <p:cNvPr id="164" name="Picture 9" descr=""/>
+          <p:cNvPr id="163" name="Picture 9" descr=""/>
           <p:cNvPicPr/>
           <p:nvPr/>
         </p:nvPicPr>
@@ -5239,7 +5212,7 @@
         <p:spPr>
           <a:xfrm>
             <a:off x="4502880" y="4073040"/>
-            <a:ext cx="2415960" cy="2416320"/>
+            <a:ext cx="2415600" cy="2415960"/>
           </a:xfrm>
           <a:prstGeom prst="rect">
             <a:avLst/>
@@ -5251,7 +5224,7 @@
       </p:pic>
       <p:pic>
         <p:nvPicPr>
-          <p:cNvPr id="165" name="Picture 8" descr=""/>
+          <p:cNvPr id="164" name="Picture 8" descr=""/>
           <p:cNvPicPr/>
           <p:nvPr/>
         </p:nvPicPr>
@@ -5262,7 +5235,7 @@
         <p:spPr>
           <a:xfrm>
             <a:off x="4592160" y="1497600"/>
-            <a:ext cx="2512800" cy="2513160"/>
+            <a:ext cx="2512440" cy="2512800"/>
           </a:xfrm>
           <a:prstGeom prst="rect">
             <a:avLst/>
@@ -5274,7 +5247,7 @@
       </p:pic>
       <p:pic>
         <p:nvPicPr>
-          <p:cNvPr id="166" name="Picture 7" descr=""/>
+          <p:cNvPr id="165" name="Picture 7" descr=""/>
           <p:cNvPicPr/>
           <p:nvPr/>
         </p:nvPicPr>
@@ -5285,7 +5258,7 @@
         <p:spPr>
           <a:xfrm>
             <a:off x="2154960" y="4038120"/>
-            <a:ext cx="2540880" cy="2540160"/>
+            <a:ext cx="2540520" cy="2539800"/>
           </a:xfrm>
           <a:prstGeom prst="rect">
             <a:avLst/>
@@ -5297,7 +5270,7 @@
       </p:pic>
       <p:pic>
         <p:nvPicPr>
-          <p:cNvPr id="167" name="Picture 6" descr=""/>
+          <p:cNvPr id="166" name="Picture 6" descr=""/>
           <p:cNvPicPr/>
           <p:nvPr/>
         </p:nvPicPr>
@@ -5308,7 +5281,7 @@
         <p:spPr>
           <a:xfrm>
             <a:off x="2314080" y="1521360"/>
-            <a:ext cx="2463120" cy="2463840"/>
+            <a:ext cx="2462760" cy="2463480"/>
           </a:xfrm>
           <a:prstGeom prst="rect">
             <a:avLst/>
@@ -5320,7 +5293,7 @@
       </p:pic>
       <p:pic>
         <p:nvPicPr>
-          <p:cNvPr id="168" name="Picture 3" descr=""/>
+          <p:cNvPr id="167" name="Picture 3" descr=""/>
           <p:cNvPicPr/>
           <p:nvPr/>
         </p:nvPicPr>
@@ -5331,7 +5304,7 @@
         <p:spPr>
           <a:xfrm>
             <a:off x="0" y="1495800"/>
-            <a:ext cx="2489400" cy="2489400"/>
+            <a:ext cx="2489040" cy="2489040"/>
           </a:xfrm>
           <a:prstGeom prst="rect">
             <a:avLst/>
@@ -5343,7 +5316,7 @@
       </p:pic>
       <p:pic>
         <p:nvPicPr>
-          <p:cNvPr id="169" name="Picture 4" descr=""/>
+          <p:cNvPr id="168" name="Picture 4" descr=""/>
           <p:cNvPicPr/>
           <p:nvPr/>
         </p:nvPicPr>
@@ -5354,7 +5327,7 @@
         <p:spPr>
           <a:xfrm>
             <a:off x="0" y="4038120"/>
-            <a:ext cx="2362320" cy="2362320"/>
+            <a:ext cx="2361960" cy="2361960"/>
           </a:xfrm>
           <a:prstGeom prst="rect">
             <a:avLst/>
@@ -5366,14 +5339,14 @@
       </p:pic>
       <p:sp>
         <p:nvSpPr>
-          <p:cNvPr id="170" name="CustomShape 1"/>
+          <p:cNvPr id="169" name="CustomShape 1"/>
           <p:cNvSpPr/>
           <p:nvPr/>
         </p:nvSpPr>
         <p:spPr>
           <a:xfrm>
             <a:off x="838440" y="365400"/>
-            <a:ext cx="10514880" cy="1324800"/>
+            <a:ext cx="10514520" cy="1324440"/>
           </a:xfrm>
           <a:prstGeom prst="rect">
             <a:avLst/>
@@ -5467,14 +5440,14 @@
       </p:grpSpPr>
       <p:sp>
         <p:nvSpPr>
-          <p:cNvPr id="171" name="CustomShape 1"/>
+          <p:cNvPr id="170" name="CustomShape 1"/>
           <p:cNvSpPr/>
           <p:nvPr/>
         </p:nvSpPr>
         <p:spPr>
           <a:xfrm>
             <a:off x="838080" y="365040"/>
-            <a:ext cx="10514880" cy="1324800"/>
+            <a:ext cx="10514520" cy="1324440"/>
           </a:xfrm>
           <a:prstGeom prst="rect">
             <a:avLst/>
@@ -5519,14 +5492,14 @@
       </p:sp>
       <p:sp>
         <p:nvSpPr>
-          <p:cNvPr id="172" name="CustomShape 2"/>
+          <p:cNvPr id="171" name="CustomShape 2"/>
           <p:cNvSpPr/>
           <p:nvPr/>
         </p:nvSpPr>
         <p:spPr>
           <a:xfrm>
             <a:off x="838080" y="1825560"/>
-            <a:ext cx="10514880" cy="4350600"/>
+            <a:ext cx="10514520" cy="4350240"/>
           </a:xfrm>
           <a:prstGeom prst="rect">
             <a:avLst/>
@@ -5545,7 +5518,7 @@
         <p:txBody>
           <a:bodyPr lIns="90000" rIns="90000" tIns="91440" bIns="91440"/>
           <a:p>
-            <a:pPr marL="228600" indent="-50040">
+            <a:pPr marL="228600" indent="-49680">
               <a:lnSpc>
                 <a:spcPct val="90000"/>
               </a:lnSpc>
@@ -5570,7 +5543,7 @@
             <a:endParaRPr/>
           </a:p>
           <a:p>
-            <a:pPr marL="228600" indent="-50040">
+            <a:pPr marL="228600" indent="-49680">
               <a:lnSpc>
                 <a:spcPct val="90000"/>
               </a:lnSpc>
@@ -5595,7 +5568,7 @@
             <a:endParaRPr/>
           </a:p>
           <a:p>
-            <a:pPr lvl="1" marL="685800" indent="-75600">
+            <a:pPr lvl="1" marL="685800" indent="-75240">
               <a:lnSpc>
                 <a:spcPct val="100000"/>
               </a:lnSpc>
@@ -5620,7 +5593,7 @@
             <a:endParaRPr/>
           </a:p>
           <a:p>
-            <a:pPr marL="228600" indent="-50040">
+            <a:pPr marL="228600" indent="-49680">
               <a:lnSpc>
                 <a:spcPct val="90000"/>
               </a:lnSpc>
@@ -5697,14 +5670,14 @@
       </p:grpSpPr>
       <p:sp>
         <p:nvSpPr>
-          <p:cNvPr id="80" name="CustomShape 1"/>
+          <p:cNvPr id="79" name="CustomShape 1"/>
           <p:cNvSpPr/>
           <p:nvPr/>
         </p:nvSpPr>
         <p:spPr>
           <a:xfrm>
             <a:off x="838080" y="365040"/>
-            <a:ext cx="10514880" cy="1324800"/>
+            <a:ext cx="10514520" cy="1324440"/>
           </a:xfrm>
           <a:prstGeom prst="rect">
             <a:avLst/>
@@ -5749,14 +5722,14 @@
       </p:sp>
       <p:sp>
         <p:nvSpPr>
-          <p:cNvPr id="81" name="CustomShape 2"/>
+          <p:cNvPr id="80" name="CustomShape 2"/>
           <p:cNvSpPr/>
           <p:nvPr/>
         </p:nvSpPr>
         <p:spPr>
           <a:xfrm>
             <a:off x="838080" y="1825560"/>
-            <a:ext cx="10514880" cy="4350600"/>
+            <a:ext cx="10514520" cy="4350240"/>
           </a:xfrm>
           <a:prstGeom prst="rect">
             <a:avLst/>
@@ -5775,7 +5748,7 @@
         <p:txBody>
           <a:bodyPr lIns="90000" rIns="90000" tIns="45000" bIns="45000"/>
           <a:p>
-            <a:pPr marL="228600" indent="-227880">
+            <a:pPr marL="228600" indent="-227520">
               <a:lnSpc>
                 <a:spcPct val="90000"/>
               </a:lnSpc>
@@ -5800,7 +5773,7 @@
             <a:endParaRPr/>
           </a:p>
           <a:p>
-            <a:pPr marL="228600" indent="-227880">
+            <a:pPr marL="228600" indent="-227520">
               <a:lnSpc>
                 <a:spcPct val="90000"/>
               </a:lnSpc>
@@ -5825,7 +5798,7 @@
             <a:endParaRPr/>
           </a:p>
           <a:p>
-            <a:pPr marL="228600" indent="-227880">
+            <a:pPr marL="228600" indent="-227520">
               <a:lnSpc>
                 <a:spcPct val="90000"/>
               </a:lnSpc>
@@ -5853,14 +5826,14 @@
       </p:sp>
       <p:sp>
         <p:nvSpPr>
-          <p:cNvPr id="82" name="CustomShape 3"/>
+          <p:cNvPr id="81" name="CustomShape 3"/>
           <p:cNvSpPr/>
           <p:nvPr/>
         </p:nvSpPr>
         <p:spPr>
           <a:xfrm>
             <a:off x="2711160" y="4380480"/>
-            <a:ext cx="5942880" cy="922680"/>
+            <a:ext cx="5942520" cy="922320"/>
           </a:xfrm>
           <a:prstGeom prst="rect">
             <a:avLst/>
@@ -5956,14 +5929,14 @@
       </p:grpSpPr>
       <p:sp>
         <p:nvSpPr>
-          <p:cNvPr id="173" name="CustomShape 1"/>
+          <p:cNvPr id="172" name="CustomShape 1"/>
           <p:cNvSpPr/>
           <p:nvPr/>
         </p:nvSpPr>
         <p:spPr>
           <a:xfrm>
             <a:off x="838080" y="365040"/>
-            <a:ext cx="10514880" cy="1324800"/>
+            <a:ext cx="10514520" cy="1324440"/>
           </a:xfrm>
           <a:prstGeom prst="rect">
             <a:avLst/>
@@ -6008,14 +5981,14 @@
       </p:sp>
       <p:sp>
         <p:nvSpPr>
-          <p:cNvPr id="174" name="CustomShape 2"/>
+          <p:cNvPr id="173" name="CustomShape 2"/>
           <p:cNvSpPr/>
           <p:nvPr/>
         </p:nvSpPr>
         <p:spPr>
           <a:xfrm>
             <a:off x="838080" y="1825560"/>
-            <a:ext cx="10514880" cy="4350600"/>
+            <a:ext cx="10514520" cy="4350240"/>
           </a:xfrm>
           <a:prstGeom prst="rect">
             <a:avLst/>
@@ -6034,7 +6007,7 @@
         <p:txBody>
           <a:bodyPr lIns="90000" rIns="90000" tIns="91440" bIns="91440"/>
           <a:p>
-            <a:pPr marL="228600" indent="-50040">
+            <a:pPr marL="228600" indent="-49680">
               <a:lnSpc>
                 <a:spcPct val="90000"/>
               </a:lnSpc>
@@ -6074,7 +6047,7 @@
             <a:endParaRPr/>
           </a:p>
           <a:p>
-            <a:pPr marL="228600" indent="-50040">
+            <a:pPr marL="228600" indent="-49680">
               <a:lnSpc>
                 <a:spcPct val="90000"/>
               </a:lnSpc>
@@ -6166,14 +6139,14 @@
       </p:grpSpPr>
       <p:sp>
         <p:nvSpPr>
-          <p:cNvPr id="175" name="CustomShape 1"/>
+          <p:cNvPr id="174" name="CustomShape 1"/>
           <p:cNvSpPr/>
           <p:nvPr/>
         </p:nvSpPr>
         <p:spPr>
           <a:xfrm>
             <a:off x="1523880" y="1122480"/>
-            <a:ext cx="9143280" cy="2386800"/>
+            <a:ext cx="9142920" cy="2386440"/>
           </a:xfrm>
           <a:prstGeom prst="rect">
             <a:avLst/>
@@ -6218,14 +6191,14 @@
       </p:sp>
       <p:sp>
         <p:nvSpPr>
-          <p:cNvPr id="176" name="CustomShape 2"/>
+          <p:cNvPr id="175" name="CustomShape 2"/>
           <p:cNvSpPr/>
           <p:nvPr/>
         </p:nvSpPr>
         <p:spPr>
           <a:xfrm>
             <a:off x="1523880" y="3602160"/>
-            <a:ext cx="9143280" cy="1654920"/>
+            <a:ext cx="9142920" cy="1654560"/>
           </a:xfrm>
           <a:prstGeom prst="rect">
             <a:avLst/>
@@ -6244,6 +6217,33 @@
       </p:sp>
     </p:spTree>
   </p:cSld>
+  <p:timing>
+    <p:tnLst>
+      <p:par>
+        <p:cTn id="41" dur="indefinite" restart="never" nodeType="tmRoot">
+          <p:childTnLst>
+            <p:seq>
+              <p:cTn id="42" nodeType="mainSeq"/>
+              <p:prevCondLst>
+                <p:cond delay="0" evt="onPrev">
+                  <p:tgtEl>
+                    <p:sldTgt/>
+                  </p:tgtEl>
+                </p:cond>
+              </p:prevCondLst>
+              <p:nextCondLst>
+                <p:cond delay="0" evt="onNext">
+                  <p:tgtEl>
+                    <p:sldTgt/>
+                  </p:tgtEl>
+                </p:cond>
+              </p:nextCondLst>
+            </p:seq>
+          </p:childTnLst>
+        </p:cTn>
+      </p:par>
+    </p:tnLst>
+  </p:timing>
 </p:sld>
 </file>
 
@@ -6266,14 +6266,14 @@
       </p:grpSpPr>
       <p:sp>
         <p:nvSpPr>
-          <p:cNvPr id="83" name="CustomShape 1"/>
+          <p:cNvPr id="82" name="CustomShape 1"/>
           <p:cNvSpPr/>
           <p:nvPr/>
         </p:nvSpPr>
         <p:spPr>
           <a:xfrm>
             <a:off x="838080" y="365040"/>
-            <a:ext cx="10514880" cy="1324800"/>
+            <a:ext cx="10514520" cy="1324440"/>
           </a:xfrm>
           <a:prstGeom prst="rect">
             <a:avLst/>
@@ -6318,19 +6318,19 @@
       </p:sp>
       <p:pic>
         <p:nvPicPr>
-          <p:cNvPr id="84" name="Shape 98" descr=""/>
+          <p:cNvPr id="83" name="Shape 98" descr=""/>
           <p:cNvPicPr/>
           <p:nvPr/>
         </p:nvPicPr>
         <p:blipFill>
           <a:blip r:embed="rId1"/>
-          <a:srcRect l="2526" t="2249" r="37138" b="0"/>
+          <a:srcRect l="2526" t="2249" r="37133" b="0"/>
           <a:stretch/>
         </p:blipFill>
         <p:spPr>
           <a:xfrm>
             <a:off x="996120" y="1616040"/>
-            <a:ext cx="4021560" cy="5007240"/>
+            <a:ext cx="4021200" cy="5006880"/>
           </a:xfrm>
           <a:prstGeom prst="rect">
             <a:avLst/>
@@ -6345,7 +6345,7 @@
       </p:pic>
       <p:pic>
         <p:nvPicPr>
-          <p:cNvPr id="85" name="Shape 99" descr=""/>
+          <p:cNvPr id="84" name="Shape 99" descr=""/>
           <p:cNvPicPr/>
           <p:nvPr/>
         </p:nvPicPr>
@@ -6356,7 +6356,7 @@
         <p:spPr>
           <a:xfrm>
             <a:off x="5119920" y="1616040"/>
-            <a:ext cx="6532560" cy="2469960"/>
+            <a:ext cx="6532200" cy="2469600"/>
           </a:xfrm>
           <a:prstGeom prst="rect">
             <a:avLst/>
@@ -6368,14 +6368,14 @@
       </p:pic>
       <p:sp>
         <p:nvSpPr>
-          <p:cNvPr id="86" name="CustomShape 2"/>
+          <p:cNvPr id="85" name="CustomShape 2"/>
           <p:cNvSpPr/>
           <p:nvPr/>
         </p:nvSpPr>
         <p:spPr>
           <a:xfrm>
             <a:off x="996120" y="1850040"/>
-            <a:ext cx="4021560" cy="1966320"/>
+            <a:ext cx="4021200" cy="1965960"/>
           </a:xfrm>
           <a:prstGeom prst="rect">
             <a:avLst/>
@@ -6398,14 +6398,14 @@
       </p:sp>
       <p:sp>
         <p:nvSpPr>
-          <p:cNvPr id="87" name="CustomShape 3"/>
+          <p:cNvPr id="86" name="CustomShape 3"/>
           <p:cNvSpPr/>
           <p:nvPr/>
         </p:nvSpPr>
         <p:spPr>
           <a:xfrm>
             <a:off x="5176800" y="1616040"/>
-            <a:ext cx="6334560" cy="509760"/>
+            <a:ext cx="6334200" cy="509400"/>
           </a:xfrm>
           <a:prstGeom prst="rect">
             <a:avLst/>
@@ -6428,14 +6428,14 @@
       </p:sp>
       <p:sp>
         <p:nvSpPr>
-          <p:cNvPr id="88" name="CustomShape 4"/>
+          <p:cNvPr id="87" name="CustomShape 4"/>
           <p:cNvSpPr/>
           <p:nvPr/>
         </p:nvSpPr>
         <p:spPr>
           <a:xfrm>
             <a:off x="996120" y="4590720"/>
-            <a:ext cx="4021560" cy="735480"/>
+            <a:ext cx="4021200" cy="735120"/>
           </a:xfrm>
           <a:prstGeom prst="rect">
             <a:avLst/>
@@ -6458,14 +6458,14 @@
       </p:sp>
       <p:sp>
         <p:nvSpPr>
-          <p:cNvPr id="89" name="CustomShape 5"/>
+          <p:cNvPr id="88" name="CustomShape 5"/>
           <p:cNvSpPr/>
           <p:nvPr/>
         </p:nvSpPr>
         <p:spPr>
           <a:xfrm>
             <a:off x="996120" y="5850720"/>
-            <a:ext cx="4021560" cy="772920"/>
+            <a:ext cx="4021200" cy="772560"/>
           </a:xfrm>
           <a:prstGeom prst="rect">
             <a:avLst/>
@@ -6488,14 +6488,14 @@
       </p:sp>
       <p:sp>
         <p:nvSpPr>
-          <p:cNvPr id="90" name="CustomShape 6"/>
+          <p:cNvPr id="89" name="CustomShape 6"/>
           <p:cNvSpPr/>
           <p:nvPr/>
         </p:nvSpPr>
         <p:spPr>
           <a:xfrm>
             <a:off x="996120" y="3817080"/>
-            <a:ext cx="4021560" cy="772920"/>
+            <a:ext cx="4021200" cy="772560"/>
           </a:xfrm>
           <a:prstGeom prst="rect">
             <a:avLst/>
@@ -6518,14 +6518,14 @@
       </p:sp>
       <p:sp>
         <p:nvSpPr>
-          <p:cNvPr id="91" name="CustomShape 7"/>
+          <p:cNvPr id="90" name="CustomShape 7"/>
           <p:cNvSpPr/>
           <p:nvPr/>
         </p:nvSpPr>
         <p:spPr>
           <a:xfrm>
             <a:off x="5218920" y="2123280"/>
-            <a:ext cx="6334560" cy="1884600"/>
+            <a:ext cx="6334200" cy="1884240"/>
           </a:xfrm>
           <a:prstGeom prst="rect">
             <a:avLst/>
@@ -6548,14 +6548,14 @@
       </p:sp>
       <p:sp>
         <p:nvSpPr>
-          <p:cNvPr id="92" name="CustomShape 8"/>
+          <p:cNvPr id="91" name="CustomShape 8"/>
           <p:cNvSpPr/>
           <p:nvPr/>
         </p:nvSpPr>
         <p:spPr>
           <a:xfrm>
             <a:off x="996120" y="5364000"/>
-            <a:ext cx="4021560" cy="476640"/>
+            <a:ext cx="4021200" cy="476280"/>
           </a:xfrm>
           <a:prstGeom prst="rect">
             <a:avLst/>
@@ -6578,14 +6578,14 @@
       </p:sp>
       <p:sp>
         <p:nvSpPr>
-          <p:cNvPr id="93" name="CustomShape 9"/>
+          <p:cNvPr id="92" name="CustomShape 9"/>
           <p:cNvSpPr/>
           <p:nvPr/>
         </p:nvSpPr>
         <p:spPr>
           <a:xfrm>
             <a:off x="9488160" y="6070320"/>
-            <a:ext cx="2063520" cy="476640"/>
+            <a:ext cx="2063160" cy="476280"/>
           </a:xfrm>
           <a:prstGeom prst="rect">
             <a:avLst/>
@@ -6634,14 +6634,14 @@
       </p:sp>
       <p:sp>
         <p:nvSpPr>
-          <p:cNvPr id="94" name="CustomShape 10"/>
+          <p:cNvPr id="93" name="CustomShape 10"/>
           <p:cNvSpPr/>
           <p:nvPr/>
         </p:nvSpPr>
         <p:spPr>
           <a:xfrm>
             <a:off x="9475920" y="5478480"/>
-            <a:ext cx="2063520" cy="476640"/>
+            <a:ext cx="2063160" cy="476280"/>
           </a:xfrm>
           <a:prstGeom prst="rect">
             <a:avLst/>
@@ -6690,14 +6690,14 @@
       </p:sp>
       <p:sp>
         <p:nvSpPr>
-          <p:cNvPr id="95" name="CustomShape 11"/>
+          <p:cNvPr id="94" name="CustomShape 11"/>
           <p:cNvSpPr/>
           <p:nvPr/>
         </p:nvSpPr>
         <p:spPr>
           <a:xfrm>
             <a:off x="9488160" y="4886640"/>
-            <a:ext cx="2063520" cy="476640"/>
+            <a:ext cx="2063160" cy="476280"/>
           </a:xfrm>
           <a:prstGeom prst="rect">
             <a:avLst/>
@@ -6746,14 +6746,14 @@
       </p:sp>
       <p:sp>
         <p:nvSpPr>
-          <p:cNvPr id="96" name="CustomShape 12"/>
+          <p:cNvPr id="95" name="CustomShape 12"/>
           <p:cNvSpPr/>
           <p:nvPr/>
         </p:nvSpPr>
         <p:spPr>
           <a:xfrm>
             <a:off x="9488160" y="4341240"/>
-            <a:ext cx="2063520" cy="476640"/>
+            <a:ext cx="2063160" cy="476280"/>
           </a:xfrm>
           <a:prstGeom prst="rect">
             <a:avLst/>
@@ -6851,7 +6851,7 @@
       </p:grpSpPr>
       <p:graphicFrame>
         <p:nvGraphicFramePr>
-          <p:cNvPr id="97" name="Table 1"/>
+          <p:cNvPr id="96" name="Table 1"/>
           <p:cNvGraphicFramePr/>
           <p:nvPr/>
         </p:nvGraphicFramePr>
@@ -11498,14 +11498,14 @@
       </p:graphicFrame>
       <p:sp>
         <p:nvSpPr>
-          <p:cNvPr id="98" name="CustomShape 2"/>
+          <p:cNvPr id="97" name="CustomShape 2"/>
           <p:cNvSpPr/>
           <p:nvPr/>
         </p:nvSpPr>
         <p:spPr>
           <a:xfrm>
             <a:off x="643680" y="343440"/>
-            <a:ext cx="5853600" cy="2421360"/>
+            <a:ext cx="5853240" cy="2421000"/>
           </a:xfrm>
           <a:prstGeom prst="rect">
             <a:avLst/>
@@ -11528,14 +11528,14 @@
       </p:sp>
       <p:sp>
         <p:nvSpPr>
-          <p:cNvPr id="99" name="CustomShape 3"/>
+          <p:cNvPr id="98" name="CustomShape 3"/>
           <p:cNvSpPr/>
           <p:nvPr/>
         </p:nvSpPr>
         <p:spPr>
           <a:xfrm>
             <a:off x="643680" y="6166800"/>
-            <a:ext cx="5853600" cy="593280"/>
+            <a:ext cx="5853240" cy="592920"/>
           </a:xfrm>
           <a:prstGeom prst="rect">
             <a:avLst/>
@@ -11558,14 +11558,14 @@
       </p:sp>
       <p:sp>
         <p:nvSpPr>
-          <p:cNvPr id="100" name="CustomShape 4"/>
+          <p:cNvPr id="99" name="CustomShape 4"/>
           <p:cNvSpPr/>
           <p:nvPr/>
         </p:nvSpPr>
         <p:spPr>
           <a:xfrm>
             <a:off x="643680" y="3702240"/>
-            <a:ext cx="5853600" cy="906120"/>
+            <a:ext cx="5853240" cy="905760"/>
           </a:xfrm>
           <a:prstGeom prst="rect">
             <a:avLst/>
@@ -11588,14 +11588,14 @@
       </p:sp>
       <p:sp>
         <p:nvSpPr>
-          <p:cNvPr id="101" name="CustomShape 5"/>
+          <p:cNvPr id="100" name="CustomShape 5"/>
           <p:cNvSpPr/>
           <p:nvPr/>
         </p:nvSpPr>
         <p:spPr>
           <a:xfrm>
             <a:off x="643680" y="5241240"/>
-            <a:ext cx="5853600" cy="886320"/>
+            <a:ext cx="5853240" cy="885960"/>
           </a:xfrm>
           <a:prstGeom prst="rect">
             <a:avLst/>
@@ -11618,14 +11618,14 @@
       </p:sp>
       <p:sp>
         <p:nvSpPr>
-          <p:cNvPr id="102" name="CustomShape 6"/>
+          <p:cNvPr id="101" name="CustomShape 6"/>
           <p:cNvSpPr/>
           <p:nvPr/>
         </p:nvSpPr>
         <p:spPr>
           <a:xfrm>
             <a:off x="643680" y="2802600"/>
-            <a:ext cx="5853600" cy="908640"/>
+            <a:ext cx="5853240" cy="908280"/>
           </a:xfrm>
           <a:prstGeom prst="rect">
             <a:avLst/>
@@ -11648,14 +11648,14 @@
       </p:sp>
       <p:sp>
         <p:nvSpPr>
-          <p:cNvPr id="103" name="CustomShape 7"/>
+          <p:cNvPr id="102" name="CustomShape 7"/>
           <p:cNvSpPr/>
           <p:nvPr/>
         </p:nvSpPr>
         <p:spPr>
           <a:xfrm>
             <a:off x="643680" y="6760800"/>
-            <a:ext cx="5853600" cy="2661120"/>
+            <a:ext cx="5853240" cy="2660760"/>
           </a:xfrm>
           <a:prstGeom prst="rect">
             <a:avLst/>
@@ -11678,14 +11678,14 @@
       </p:sp>
       <p:sp>
         <p:nvSpPr>
-          <p:cNvPr id="104" name="CustomShape 8"/>
+          <p:cNvPr id="103" name="CustomShape 8"/>
           <p:cNvSpPr/>
           <p:nvPr/>
         </p:nvSpPr>
         <p:spPr>
           <a:xfrm>
             <a:off x="643680" y="4651200"/>
-            <a:ext cx="5853600" cy="546840"/>
+            <a:ext cx="5853240" cy="546480"/>
           </a:xfrm>
           <a:prstGeom prst="rect">
             <a:avLst/>
@@ -11757,14 +11757,14 @@
       </p:grpSpPr>
       <p:sp>
         <p:nvSpPr>
-          <p:cNvPr id="105" name="CustomShape 1"/>
+          <p:cNvPr id="104" name="CustomShape 1"/>
           <p:cNvSpPr/>
           <p:nvPr/>
         </p:nvSpPr>
         <p:spPr>
           <a:xfrm>
             <a:off x="838080" y="365040"/>
-            <a:ext cx="10514880" cy="1324800"/>
+            <a:ext cx="10514520" cy="1324440"/>
           </a:xfrm>
           <a:prstGeom prst="rect">
             <a:avLst/>
@@ -11809,14 +11809,14 @@
       </p:sp>
       <p:sp>
         <p:nvSpPr>
-          <p:cNvPr id="106" name="CustomShape 2"/>
+          <p:cNvPr id="105" name="CustomShape 2"/>
           <p:cNvSpPr/>
           <p:nvPr/>
         </p:nvSpPr>
         <p:spPr>
           <a:xfrm>
             <a:off x="838080" y="1570320"/>
-            <a:ext cx="10514880" cy="4350600"/>
+            <a:ext cx="10514520" cy="4350240"/>
           </a:xfrm>
           <a:prstGeom prst="rect">
             <a:avLst/>
@@ -11835,7 +11835,7 @@
         <p:txBody>
           <a:bodyPr lIns="90000" rIns="90000" tIns="45000" bIns="45000"/>
           <a:p>
-            <a:pPr marL="228600" indent="-227880">
+            <a:pPr marL="228600" indent="-227520">
               <a:lnSpc>
                 <a:spcPct val="90000"/>
               </a:lnSpc>
@@ -11860,7 +11860,7 @@
             <a:endParaRPr/>
           </a:p>
           <a:p>
-            <a:pPr marL="228600" indent="-50040">
+            <a:pPr marL="228600" indent="-49680">
               <a:lnSpc>
                 <a:spcPct val="90000"/>
               </a:lnSpc>
@@ -11868,7 +11868,7 @@
             <a:endParaRPr/>
           </a:p>
           <a:p>
-            <a:pPr marL="228600" indent="-50040">
+            <a:pPr marL="228600" indent="-49680">
               <a:lnSpc>
                 <a:spcPct val="90000"/>
               </a:lnSpc>
@@ -11879,7 +11879,7 @@
       </p:sp>
       <p:graphicFrame>
         <p:nvGraphicFramePr>
-          <p:cNvPr id="107" name="Table 3"/>
+          <p:cNvPr id="106" name="Table 3"/>
           <p:cNvGraphicFramePr/>
           <p:nvPr/>
         </p:nvGraphicFramePr>
@@ -13792,14 +13792,14 @@
       </p:graphicFrame>
       <p:sp>
         <p:nvSpPr>
-          <p:cNvPr id="108" name="CustomShape 4"/>
+          <p:cNvPr id="107" name="CustomShape 4"/>
           <p:cNvSpPr/>
           <p:nvPr/>
         </p:nvSpPr>
         <p:spPr>
           <a:xfrm>
             <a:off x="8782560" y="2144520"/>
-            <a:ext cx="2570760" cy="2030760"/>
+            <a:ext cx="2570400" cy="2030400"/>
           </a:xfrm>
           <a:prstGeom prst="rect">
             <a:avLst/>
@@ -13864,7 +13864,7 @@
             <a:endParaRPr/>
           </a:p>
           <a:p>
-            <a:pPr marL="285840" indent="-285120">
+            <a:pPr marL="285840" indent="-284760">
               <a:lnSpc>
                 <a:spcPct val="100000"/>
               </a:lnSpc>
@@ -13889,7 +13889,7 @@
             <a:endParaRPr/>
           </a:p>
           <a:p>
-            <a:pPr marL="285840" indent="-285120">
+            <a:pPr marL="285840" indent="-284760">
               <a:lnSpc>
                 <a:spcPct val="100000"/>
               </a:lnSpc>
@@ -13925,14 +13925,14 @@
       </p:sp>
       <p:sp>
         <p:nvSpPr>
-          <p:cNvPr id="109" name="CustomShape 5"/>
+          <p:cNvPr id="108" name="CustomShape 5"/>
           <p:cNvSpPr/>
           <p:nvPr/>
         </p:nvSpPr>
         <p:spPr>
           <a:xfrm>
             <a:off x="8782560" y="4344120"/>
-            <a:ext cx="2570760" cy="2030760"/>
+            <a:ext cx="2570400" cy="2030400"/>
           </a:xfrm>
           <a:prstGeom prst="rect">
             <a:avLst/>
@@ -13974,7 +13974,7 @@
             <a:endParaRPr/>
           </a:p>
           <a:p>
-            <a:pPr marL="285840" indent="-285120">
+            <a:pPr marL="285840" indent="-284760">
               <a:lnSpc>
                 <a:spcPct val="100000"/>
               </a:lnSpc>
@@ -13999,7 +13999,7 @@
             <a:endParaRPr/>
           </a:p>
           <a:p>
-            <a:pPr marL="285840" indent="-285120">
+            <a:pPr marL="285840" indent="-284760">
               <a:lnSpc>
                 <a:spcPct val="100000"/>
               </a:lnSpc>
@@ -14084,14 +14084,14 @@
       </p:grpSpPr>
       <p:sp>
         <p:nvSpPr>
-          <p:cNvPr id="110" name="CustomShape 1"/>
+          <p:cNvPr id="109" name="CustomShape 1"/>
           <p:cNvSpPr/>
           <p:nvPr/>
         </p:nvSpPr>
         <p:spPr>
           <a:xfrm>
             <a:off x="838080" y="365040"/>
-            <a:ext cx="10514880" cy="1324800"/>
+            <a:ext cx="10514520" cy="1324440"/>
           </a:xfrm>
           <a:prstGeom prst="rect">
             <a:avLst/>
@@ -14136,14 +14136,14 @@
       </p:sp>
       <p:sp>
         <p:nvSpPr>
-          <p:cNvPr id="111" name="CustomShape 2"/>
+          <p:cNvPr id="110" name="CustomShape 2"/>
           <p:cNvSpPr/>
           <p:nvPr/>
         </p:nvSpPr>
         <p:spPr>
           <a:xfrm>
             <a:off x="838080" y="1570320"/>
-            <a:ext cx="10514880" cy="4350600"/>
+            <a:ext cx="10514520" cy="4350240"/>
           </a:xfrm>
           <a:prstGeom prst="rect">
             <a:avLst/>
@@ -14162,7 +14162,7 @@
         <p:txBody>
           <a:bodyPr lIns="90000" rIns="90000" tIns="45000" bIns="45000"/>
           <a:p>
-            <a:pPr marL="228600" indent="-227880">
+            <a:pPr marL="228600" indent="-227520">
               <a:lnSpc>
                 <a:spcPct val="90000"/>
               </a:lnSpc>
@@ -14182,12 +14182,28 @@
                 <a:latin typeface="Calibri"/>
                 <a:ea typeface="Calibri"/>
               </a:rPr>
-              <a:t>Collected from ??</a:t>
+              <a:t>Collected from </a:t>
             </a:r>
-            <a:endParaRPr/>
-          </a:p>
-          <a:p>
-            <a:pPr marL="228600" indent="-227880">
+            <a:r>
+              <a:rPr lang="en-GB" sz="2800" spc="-1" strike="noStrike">
+                <a:solidFill>
+                  <a:srgbClr val="000000"/>
+                </a:solidFill>
+                <a:uFill>
+                  <a:solidFill>
+                    <a:srgbClr val="ffffff"/>
+                  </a:solidFill>
+                </a:uFill>
+                <a:latin typeface="Calibri"/>
+                <a:ea typeface="Calibri"/>
+                <a:hlinkClick r:id="rId1"/>
+              </a:rPr>
+              <a:t>www.openflights.org</a:t>
+            </a:r>
+            <a:endParaRPr/>
+          </a:p>
+          <a:p>
+            <a:pPr marL="228600" indent="-227520">
               <a:lnSpc>
                 <a:spcPct val="90000"/>
               </a:lnSpc>
@@ -14212,7 +14228,7 @@
             <a:endParaRPr/>
           </a:p>
           <a:p>
-            <a:pPr marL="228600" indent="-50040">
+            <a:pPr marL="228600" indent="-49680">
               <a:lnSpc>
                 <a:spcPct val="90000"/>
               </a:lnSpc>
@@ -14220,7 +14236,7 @@
             <a:endParaRPr/>
           </a:p>
           <a:p>
-            <a:pPr marL="228600" indent="-50040">
+            <a:pPr marL="228600" indent="-49680">
               <a:lnSpc>
                 <a:spcPct val="90000"/>
               </a:lnSpc>
@@ -14231,19 +14247,19 @@
       </p:sp>
       <p:pic>
         <p:nvPicPr>
-          <p:cNvPr id="112" name="Picture 1" descr=""/>
+          <p:cNvPr id="111" name="Picture 1" descr=""/>
           <p:cNvPicPr/>
           <p:nvPr/>
         </p:nvPicPr>
         <p:blipFill>
-          <a:blip r:embed="rId1"/>
+          <a:blip r:embed="rId2"/>
           <a:srcRect l="23190" t="21113" r="20479" b="16895"/>
           <a:stretch/>
         </p:blipFill>
         <p:spPr>
           <a:xfrm>
             <a:off x="3490200" y="2723400"/>
-            <a:ext cx="5017320" cy="3944520"/>
+            <a:ext cx="5016960" cy="3944160"/>
           </a:xfrm>
           <a:prstGeom prst="rect">
             <a:avLst/>
@@ -14255,14 +14271,14 @@
       </p:pic>
       <p:sp>
         <p:nvSpPr>
-          <p:cNvPr id="113" name="CustomShape 3"/>
+          <p:cNvPr id="112" name="CustomShape 3"/>
           <p:cNvSpPr/>
           <p:nvPr/>
         </p:nvSpPr>
         <p:spPr>
           <a:xfrm>
             <a:off x="3587760" y="6033600"/>
-            <a:ext cx="3013920" cy="516240"/>
+            <a:ext cx="3013560" cy="515880"/>
           </a:xfrm>
           <a:prstGeom prst="rect">
             <a:avLst/>
@@ -14379,14 +14395,14 @@
       </p:grpSpPr>
       <p:sp>
         <p:nvSpPr>
-          <p:cNvPr id="114" name="CustomShape 1"/>
+          <p:cNvPr id="113" name="CustomShape 1"/>
           <p:cNvSpPr/>
           <p:nvPr/>
         </p:nvSpPr>
         <p:spPr>
           <a:xfrm>
             <a:off x="838080" y="365040"/>
-            <a:ext cx="10514880" cy="1324800"/>
+            <a:ext cx="10514520" cy="1324440"/>
           </a:xfrm>
           <a:prstGeom prst="rect">
             <a:avLst/>
@@ -14431,14 +14447,14 @@
       </p:sp>
       <p:sp>
         <p:nvSpPr>
-          <p:cNvPr id="115" name="CustomShape 2"/>
+          <p:cNvPr id="114" name="CustomShape 2"/>
           <p:cNvSpPr/>
           <p:nvPr/>
         </p:nvSpPr>
         <p:spPr>
           <a:xfrm>
             <a:off x="838080" y="1559880"/>
-            <a:ext cx="10514880" cy="4350600"/>
+            <a:ext cx="10514520" cy="4350240"/>
           </a:xfrm>
           <a:prstGeom prst="rect">
             <a:avLst/>
@@ -14457,7 +14473,7 @@
         <p:txBody>
           <a:bodyPr lIns="90000" rIns="90000" tIns="45000" bIns="45000"/>
           <a:p>
-            <a:pPr marL="228600" indent="-227880">
+            <a:pPr marL="228600" indent="-227520">
               <a:lnSpc>
                 <a:spcPct val="90000"/>
               </a:lnSpc>
@@ -14498,7 +14514,7 @@
             <a:endParaRPr/>
           </a:p>
           <a:p>
-            <a:pPr marL="228600" indent="-50040">
+            <a:pPr marL="228600" indent="-49680">
               <a:lnSpc>
                 <a:spcPct val="100000"/>
               </a:lnSpc>
@@ -14561,7 +14577,7 @@
       </p:sp>
       <p:pic>
         <p:nvPicPr>
-          <p:cNvPr id="116" name="Shape 126" descr=""/>
+          <p:cNvPr id="115" name="Shape 126" descr=""/>
           <p:cNvPicPr/>
           <p:nvPr/>
         </p:nvPicPr>
@@ -14572,7 +14588,7 @@
         <p:spPr>
           <a:xfrm>
             <a:off x="206280" y="3252960"/>
-            <a:ext cx="4039200" cy="1510560"/>
+            <a:ext cx="4038840" cy="1510200"/>
           </a:xfrm>
           <a:prstGeom prst="rect">
             <a:avLst/>
@@ -14584,14 +14600,14 @@
       </p:pic>
       <p:sp>
         <p:nvSpPr>
-          <p:cNvPr id="117" name="CustomShape 3"/>
+          <p:cNvPr id="116" name="CustomShape 3"/>
           <p:cNvSpPr/>
           <p:nvPr/>
         </p:nvSpPr>
         <p:spPr>
           <a:xfrm>
             <a:off x="1081080" y="4706280"/>
-            <a:ext cx="2520000" cy="307080"/>
+            <a:ext cx="2519640" cy="306720"/>
           </a:xfrm>
           <a:prstGeom prst="rect">
             <a:avLst/>
@@ -14636,7 +14652,7 @@
       </p:sp>
       <p:pic>
         <p:nvPicPr>
-          <p:cNvPr id="118" name="Shape 128" descr=""/>
+          <p:cNvPr id="117" name="Shape 128" descr=""/>
           <p:cNvPicPr/>
           <p:nvPr/>
         </p:nvPicPr>
@@ -14647,7 +14663,7 @@
         <p:spPr>
           <a:xfrm>
             <a:off x="431280" y="5014080"/>
-            <a:ext cx="3512880" cy="1878120"/>
+            <a:ext cx="3512520" cy="1877760"/>
           </a:xfrm>
           <a:prstGeom prst="rect">
             <a:avLst/>
@@ -14659,14 +14675,14 @@
       </p:pic>
       <p:sp>
         <p:nvSpPr>
-          <p:cNvPr id="119" name="CustomShape 4"/>
+          <p:cNvPr id="118" name="CustomShape 4"/>
           <p:cNvSpPr/>
           <p:nvPr/>
         </p:nvSpPr>
         <p:spPr>
           <a:xfrm>
             <a:off x="750240" y="5649480"/>
-            <a:ext cx="2802240" cy="522360"/>
+            <a:ext cx="2801880" cy="522000"/>
           </a:xfrm>
           <a:prstGeom prst="rect">
             <a:avLst/>
@@ -14734,14 +14750,14 @@
       </p:sp>
       <p:sp>
         <p:nvSpPr>
-          <p:cNvPr id="120" name="CustomShape 5"/>
+          <p:cNvPr id="119" name="CustomShape 5"/>
           <p:cNvSpPr/>
           <p:nvPr/>
         </p:nvSpPr>
         <p:spPr>
           <a:xfrm>
             <a:off x="237600" y="2787480"/>
-            <a:ext cx="4007880" cy="368640"/>
+            <a:ext cx="4007520" cy="368280"/>
           </a:xfrm>
           <a:prstGeom prst="rect">
             <a:avLst/>
@@ -14788,14 +14804,14 @@
       </p:sp>
       <p:sp>
         <p:nvSpPr>
-          <p:cNvPr id="121" name="CustomShape 6"/>
+          <p:cNvPr id="120" name="CustomShape 6"/>
           <p:cNvSpPr/>
           <p:nvPr/>
         </p:nvSpPr>
         <p:spPr>
           <a:xfrm>
             <a:off x="4461120" y="2804760"/>
-            <a:ext cx="4007880" cy="368640"/>
+            <a:ext cx="4007520" cy="368280"/>
           </a:xfrm>
           <a:prstGeom prst="rect">
             <a:avLst/>
@@ -14842,7 +14858,7 @@
       </p:sp>
       <p:pic>
         <p:nvPicPr>
-          <p:cNvPr id="122" name="Shape 132" descr=""/>
+          <p:cNvPr id="121" name="Shape 132" descr=""/>
           <p:cNvPicPr/>
           <p:nvPr/>
         </p:nvPicPr>
@@ -14853,7 +14869,7 @@
         <p:spPr>
           <a:xfrm>
             <a:off x="4322880" y="3406320"/>
-            <a:ext cx="4167720" cy="2833560"/>
+            <a:ext cx="4167360" cy="2833200"/>
           </a:xfrm>
           <a:prstGeom prst="rect">
             <a:avLst/>
@@ -14865,14 +14881,14 @@
       </p:pic>
       <p:sp>
         <p:nvSpPr>
-          <p:cNvPr id="123" name="CustomShape 7"/>
+          <p:cNvPr id="122" name="CustomShape 7"/>
           <p:cNvSpPr/>
           <p:nvPr/>
         </p:nvSpPr>
         <p:spPr>
           <a:xfrm>
             <a:off x="4252320" y="6240600"/>
-            <a:ext cx="4078440" cy="307080"/>
+            <a:ext cx="4078080" cy="306720"/>
           </a:xfrm>
           <a:prstGeom prst="rect">
             <a:avLst/>
@@ -14917,7 +14933,7 @@
       </p:sp>
       <p:pic>
         <p:nvPicPr>
-          <p:cNvPr id="124" name="Shape 134" descr=""/>
+          <p:cNvPr id="123" name="Shape 134" descr=""/>
           <p:cNvPicPr/>
           <p:nvPr/>
         </p:nvPicPr>
@@ -14929,7 +14945,7 @@
         <p:spPr>
           <a:xfrm>
             <a:off x="8632800" y="3252960"/>
-            <a:ext cx="3146040" cy="2380320"/>
+            <a:ext cx="3145680" cy="2379960"/>
           </a:xfrm>
           <a:prstGeom prst="rect">
             <a:avLst/>
@@ -14941,14 +14957,14 @@
       </p:pic>
       <p:sp>
         <p:nvSpPr>
-          <p:cNvPr id="125" name="CustomShape 8"/>
+          <p:cNvPr id="124" name="CustomShape 8"/>
           <p:cNvSpPr/>
           <p:nvPr/>
         </p:nvSpPr>
         <p:spPr>
           <a:xfrm>
             <a:off x="8629200" y="2804760"/>
-            <a:ext cx="3493440" cy="368640"/>
+            <a:ext cx="3493080" cy="368280"/>
           </a:xfrm>
           <a:prstGeom prst="rect">
             <a:avLst/>
@@ -14995,14 +15011,14 @@
       </p:sp>
       <p:sp>
         <p:nvSpPr>
-          <p:cNvPr id="126" name="CustomShape 9"/>
+          <p:cNvPr id="125" name="CustomShape 9"/>
           <p:cNvSpPr/>
           <p:nvPr/>
         </p:nvSpPr>
         <p:spPr>
           <a:xfrm>
             <a:off x="8709480" y="6025320"/>
-            <a:ext cx="3187800" cy="522360"/>
+            <a:ext cx="3187440" cy="522000"/>
           </a:xfrm>
           <a:prstGeom prst="rect">
             <a:avLst/>
@@ -15096,14 +15112,14 @@
       </p:grpSpPr>
       <p:sp>
         <p:nvSpPr>
-          <p:cNvPr id="127" name="CustomShape 1"/>
+          <p:cNvPr id="126" name="CustomShape 1"/>
           <p:cNvSpPr/>
           <p:nvPr/>
         </p:nvSpPr>
         <p:spPr>
           <a:xfrm>
             <a:off x="838080" y="365040"/>
-            <a:ext cx="10514880" cy="1325160"/>
+            <a:ext cx="10514520" cy="1324800"/>
           </a:xfrm>
           <a:prstGeom prst="rect">
             <a:avLst/>
@@ -15148,14 +15164,14 @@
       </p:sp>
       <p:sp>
         <p:nvSpPr>
-          <p:cNvPr id="128" name="CustomShape 2"/>
+          <p:cNvPr id="127" name="CustomShape 2"/>
           <p:cNvSpPr/>
           <p:nvPr/>
         </p:nvSpPr>
         <p:spPr>
           <a:xfrm>
             <a:off x="838080" y="1825560"/>
-            <a:ext cx="7965000" cy="4350960"/>
+            <a:ext cx="7964640" cy="4350600"/>
           </a:xfrm>
           <a:prstGeom prst="rect">
             <a:avLst/>
@@ -15174,7 +15190,7 @@
         <p:txBody>
           <a:bodyPr lIns="90000" rIns="90000" tIns="45000" bIns="45000"/>
           <a:p>
-            <a:pPr marL="228600" indent="-227880">
+            <a:pPr marL="228600" indent="-227520">
               <a:lnSpc>
                 <a:spcPct val="90000"/>
               </a:lnSpc>
@@ -15199,7 +15215,7 @@
             <a:endParaRPr/>
           </a:p>
           <a:p>
-            <a:pPr lvl="1" marL="685800" indent="-75600">
+            <a:pPr lvl="1" marL="685800" indent="-75240">
               <a:lnSpc>
                 <a:spcPct val="90000"/>
               </a:lnSpc>
@@ -15227,7 +15243,7 @@
             <a:endParaRPr/>
           </a:p>
           <a:p>
-            <a:pPr lvl="1" marL="685800" indent="-75600">
+            <a:pPr lvl="1" marL="685800" indent="-75240">
               <a:lnSpc>
                 <a:spcPct val="90000"/>
               </a:lnSpc>
@@ -15252,7 +15268,7 @@
             <a:endParaRPr/>
           </a:p>
           <a:p>
-            <a:pPr lvl="2" marL="1143000" indent="-100800">
+            <a:pPr lvl="2" marL="1143000" indent="-100440">
               <a:lnSpc>
                 <a:spcPct val="90000"/>
               </a:lnSpc>
@@ -15297,7 +15313,7 @@
             <a:endParaRPr/>
           </a:p>
           <a:p>
-            <a:pPr marL="228600" indent="-50040">
+            <a:pPr marL="228600" indent="-49680">
               <a:lnSpc>
                 <a:spcPct val="90000"/>
               </a:lnSpc>
@@ -15322,7 +15338,7 @@
             <a:endParaRPr/>
           </a:p>
           <a:p>
-            <a:pPr lvl="1" marL="685800" indent="-75600">
+            <a:pPr lvl="1" marL="685800" indent="-75240">
               <a:lnSpc>
                 <a:spcPct val="90000"/>
               </a:lnSpc>
@@ -15351,7 +15367,7 @@
             <a:endParaRPr/>
           </a:p>
           <a:p>
-            <a:pPr lvl="1" marL="685800" indent="-75600">
+            <a:pPr lvl="1" marL="685800" indent="-75240">
               <a:lnSpc>
                 <a:spcPct val="90000"/>
               </a:lnSpc>
@@ -15377,7 +15393,7 @@
             <a:endParaRPr/>
           </a:p>
           <a:p>
-            <a:pPr lvl="2" marL="1143000" indent="-100800">
+            <a:pPr lvl="2" marL="1143000" indent="-100440">
               <a:lnSpc>
                 <a:spcPct val="90000"/>
               </a:lnSpc>
@@ -15417,7 +15433,7 @@
       </p:sp>
       <p:pic>
         <p:nvPicPr>
-          <p:cNvPr id="129" name="Shape 143" descr=""/>
+          <p:cNvPr id="128" name="Shape 143" descr=""/>
           <p:cNvPicPr/>
           <p:nvPr/>
         </p:nvPicPr>
@@ -15428,7 +15444,7 @@
         <p:spPr>
           <a:xfrm>
             <a:off x="9021240" y="3590640"/>
-            <a:ext cx="2920320" cy="3321360"/>
+            <a:ext cx="2919960" cy="3321000"/>
           </a:xfrm>
           <a:prstGeom prst="rect">
             <a:avLst/>
@@ -15440,7 +15456,7 @@
       </p:pic>
       <p:pic>
         <p:nvPicPr>
-          <p:cNvPr id="130" name="Shape 144" descr=""/>
+          <p:cNvPr id="129" name="Shape 144" descr=""/>
           <p:cNvPicPr/>
           <p:nvPr/>
         </p:nvPicPr>
@@ -15451,7 +15467,7 @@
         <p:spPr>
           <a:xfrm>
             <a:off x="8919720" y="1464840"/>
-            <a:ext cx="3114000" cy="1608840"/>
+            <a:ext cx="3113640" cy="1608480"/>
           </a:xfrm>
           <a:prstGeom prst="rect">
             <a:avLst/>
@@ -15463,14 +15479,14 @@
       </p:pic>
       <p:sp>
         <p:nvSpPr>
-          <p:cNvPr id="131" name="CustomShape 3"/>
+          <p:cNvPr id="130" name="CustomShape 3"/>
           <p:cNvSpPr/>
           <p:nvPr/>
         </p:nvSpPr>
         <p:spPr>
           <a:xfrm>
             <a:off x="9150120" y="2972520"/>
-            <a:ext cx="2653200" cy="912240"/>
+            <a:ext cx="2652840" cy="911880"/>
           </a:xfrm>
           <a:prstGeom prst="rect">
             <a:avLst/>
@@ -15656,14 +15672,14 @@
       </p:grpSpPr>
       <p:sp>
         <p:nvSpPr>
-          <p:cNvPr id="132" name="CustomShape 1"/>
+          <p:cNvPr id="131" name="CustomShape 1"/>
           <p:cNvSpPr/>
           <p:nvPr/>
         </p:nvSpPr>
         <p:spPr>
           <a:xfrm>
             <a:off x="838080" y="365040"/>
-            <a:ext cx="10514880" cy="1325160"/>
+            <a:ext cx="10514520" cy="1324800"/>
           </a:xfrm>
           <a:prstGeom prst="rect">
             <a:avLst/>
@@ -15708,14 +15724,14 @@
       </p:sp>
       <p:sp>
         <p:nvSpPr>
-          <p:cNvPr id="133" name="CustomShape 2"/>
+          <p:cNvPr id="132" name="CustomShape 2"/>
           <p:cNvSpPr/>
           <p:nvPr/>
         </p:nvSpPr>
         <p:spPr>
           <a:xfrm>
             <a:off x="838080" y="1825560"/>
-            <a:ext cx="10514880" cy="4350600"/>
+            <a:ext cx="10514520" cy="4350240"/>
           </a:xfrm>
           <a:prstGeom prst="rect">
             <a:avLst/>
@@ -15734,7 +15750,7 @@
         <p:txBody>
           <a:bodyPr lIns="90000" rIns="90000" tIns="45000" bIns="45000"/>
           <a:p>
-            <a:pPr marL="457200" indent="-227880">
+            <a:pPr marL="457200" indent="-227520">
               <a:lnSpc>
                 <a:spcPct val="90000"/>
               </a:lnSpc>
@@ -15759,7 +15775,7 @@
             <a:endParaRPr/>
           </a:p>
           <a:p>
-            <a:pPr marL="457200" indent="-227880">
+            <a:pPr marL="457200" indent="-227520">
               <a:lnSpc>
                 <a:spcPct val="90000"/>
               </a:lnSpc>
@@ -15788,7 +15804,7 @@
             <a:endParaRPr/>
           </a:p>
           <a:p>
-            <a:pPr marL="228600" indent="-50040">
+            <a:pPr marL="228600" indent="-49680">
               <a:lnSpc>
                 <a:spcPct val="90000"/>
               </a:lnSpc>
@@ -15799,7 +15815,7 @@
       </p:sp>
       <p:pic>
         <p:nvPicPr>
-          <p:cNvPr id="134" name="Shape 152" descr=""/>
+          <p:cNvPr id="133" name="Shape 152" descr=""/>
           <p:cNvPicPr/>
           <p:nvPr/>
         </p:nvPicPr>
@@ -15810,7 +15826,7 @@
         <p:spPr>
           <a:xfrm>
             <a:off x="5716800" y="2760480"/>
-            <a:ext cx="5636520" cy="3891240"/>
+            <a:ext cx="5636160" cy="3890880"/>
           </a:xfrm>
           <a:prstGeom prst="rect">
             <a:avLst/>

</xml_diff>